<commit_message>
Buổi báo cáo cuối cùng rồi.
</commit_message>
<xml_diff>
--- a/FinalProject/Final.pptx
+++ b/FinalProject/Final.pptx
@@ -3618,12 +3618,12 @@
         <p:spPr>
           <a:xfrm>
             <a:off x="0" y="0"/>
-            <a:ext cx="12192000" cy="1159540"/>
+            <a:ext cx="12192000" cy="551935"/>
           </a:xfrm>
         </p:spPr>
         <p:txBody>
           <a:bodyPr>
-            <a:normAutofit/>
+            <a:normAutofit fontScale="90000"/>
           </a:bodyPr>
           <a:lstStyle/>
           <a:p>
@@ -3763,7 +3763,7 @@
         </p:blipFill>
         <p:spPr>
           <a:xfrm>
-            <a:off x="288324" y="2427224"/>
+            <a:off x="288324" y="1978048"/>
             <a:ext cx="11640369" cy="4349253"/>
           </a:xfrm>
           <a:prstGeom prst="rect">
@@ -3850,13 +3850,13 @@
         </p:nvSpPr>
         <p:spPr>
           <a:xfrm>
-            <a:off x="0" y="0"/>
-            <a:ext cx="12192000" cy="864973"/>
+            <a:off x="-1" y="0"/>
+            <a:ext cx="12266141" cy="576649"/>
           </a:xfrm>
         </p:spPr>
         <p:txBody>
           <a:bodyPr>
-            <a:normAutofit/>
+            <a:normAutofit fontScale="90000"/>
           </a:bodyPr>
           <a:lstStyle/>
           <a:p>
@@ -3996,7 +3996,7 @@
         </p:blipFill>
         <p:spPr>
           <a:xfrm>
-            <a:off x="214182" y="2892446"/>
+            <a:off x="350457" y="1978048"/>
             <a:ext cx="11756605" cy="3756290"/>
           </a:xfrm>
           <a:prstGeom prst="rect">
@@ -4083,13 +4083,13 @@
         </p:nvSpPr>
         <p:spPr>
           <a:xfrm>
-            <a:off x="0" y="0"/>
-            <a:ext cx="12192000" cy="914400"/>
+            <a:off x="-8238" y="0"/>
+            <a:ext cx="12200238" cy="527222"/>
           </a:xfrm>
         </p:spPr>
         <p:txBody>
           <a:bodyPr>
-            <a:normAutofit/>
+            <a:normAutofit fontScale="90000"/>
           </a:bodyPr>
           <a:lstStyle/>
           <a:p>
@@ -4229,7 +4229,7 @@
         </p:blipFill>
         <p:spPr>
           <a:xfrm>
-            <a:off x="296562" y="1994084"/>
+            <a:off x="358695" y="1533205"/>
             <a:ext cx="11666139" cy="4728421"/>
           </a:xfrm>
           <a:prstGeom prst="rect">
@@ -4245,7 +4245,7 @@
         </p:nvSpPr>
         <p:spPr>
           <a:xfrm>
-            <a:off x="350457" y="1608716"/>
+            <a:off x="358695" y="1163873"/>
             <a:ext cx="2468433" cy="369332"/>
           </a:xfrm>
           <a:prstGeom prst="rect">
@@ -4317,12 +4317,12 @@
         <p:spPr>
           <a:xfrm>
             <a:off x="0" y="0"/>
-            <a:ext cx="12192000" cy="963827"/>
+            <a:ext cx="12192000" cy="576649"/>
           </a:xfrm>
         </p:spPr>
         <p:txBody>
           <a:bodyPr>
-            <a:normAutofit/>
+            <a:normAutofit fontScale="90000"/>
           </a:bodyPr>
           <a:lstStyle/>
           <a:p>
@@ -4462,7 +4462,7 @@
         </p:blipFill>
         <p:spPr>
           <a:xfrm>
-            <a:off x="247135" y="2635776"/>
+            <a:off x="196272" y="1590000"/>
             <a:ext cx="11799456" cy="3641027"/>
           </a:xfrm>
           <a:prstGeom prst="rect">
@@ -4478,7 +4478,7 @@
         </p:nvSpPr>
         <p:spPr>
           <a:xfrm>
-            <a:off x="318373" y="1945598"/>
+            <a:off x="367800" y="1220668"/>
             <a:ext cx="2843022" cy="369332"/>
           </a:xfrm>
           <a:prstGeom prst="rect">
@@ -4549,13 +4549,13 @@
         </p:nvSpPr>
         <p:spPr>
           <a:xfrm>
-            <a:off x="0" y="0"/>
-            <a:ext cx="12192000" cy="906162"/>
+            <a:off x="-1" y="0"/>
+            <a:ext cx="12249665" cy="593124"/>
           </a:xfrm>
         </p:spPr>
         <p:txBody>
           <a:bodyPr>
-            <a:normAutofit/>
+            <a:normAutofit fontScale="90000"/>
           </a:bodyPr>
           <a:lstStyle/>
           <a:p>
@@ -4695,7 +4695,7 @@
         </p:blipFill>
         <p:spPr>
           <a:xfrm>
-            <a:off x="230659" y="2603690"/>
+            <a:off x="238368" y="1590436"/>
             <a:ext cx="11715264" cy="3888162"/>
           </a:xfrm>
           <a:prstGeom prst="rect">
@@ -4711,7 +4711,7 @@
         </p:nvSpPr>
         <p:spPr>
           <a:xfrm>
-            <a:off x="382541" y="1977682"/>
+            <a:off x="464920" y="1285704"/>
             <a:ext cx="822148" cy="369332"/>
           </a:xfrm>
           <a:prstGeom prst="rect">
@@ -4783,12 +4783,12 @@
         <p:spPr>
           <a:xfrm>
             <a:off x="0" y="0"/>
-            <a:ext cx="12192000" cy="914400"/>
+            <a:ext cx="12192000" cy="626076"/>
           </a:xfrm>
         </p:spPr>
         <p:txBody>
           <a:bodyPr>
-            <a:normAutofit/>
+            <a:normAutofit fontScale="90000"/>
           </a:bodyPr>
           <a:lstStyle/>
           <a:p>
@@ -4928,7 +4928,7 @@
         </p:blipFill>
         <p:spPr>
           <a:xfrm>
-            <a:off x="214184" y="2587646"/>
+            <a:off x="188185" y="1450827"/>
             <a:ext cx="11815629" cy="4143535"/>
           </a:xfrm>
           <a:prstGeom prst="rect">
@@ -4944,7 +4944,7 @@
         </p:nvSpPr>
         <p:spPr>
           <a:xfrm>
-            <a:off x="350457" y="1608716"/>
+            <a:off x="589354" y="1081495"/>
             <a:ext cx="1459117" cy="369332"/>
           </a:xfrm>
           <a:prstGeom prst="rect">
@@ -5015,13 +5015,13 @@
         </p:nvSpPr>
         <p:spPr>
           <a:xfrm>
-            <a:off x="0" y="0"/>
-            <a:ext cx="12192000" cy="955589"/>
+            <a:off x="-1" y="1"/>
+            <a:ext cx="12257903" cy="617838"/>
           </a:xfrm>
         </p:spPr>
         <p:txBody>
           <a:bodyPr>
-            <a:normAutofit/>
+            <a:normAutofit fontScale="90000"/>
           </a:bodyPr>
           <a:lstStyle/>
           <a:p>
@@ -5161,7 +5161,7 @@
         </p:blipFill>
         <p:spPr>
           <a:xfrm>
-            <a:off x="202728" y="2764109"/>
+            <a:off x="227441" y="1978048"/>
             <a:ext cx="11669930" cy="3739881"/>
           </a:xfrm>
           <a:prstGeom prst="rect">
@@ -5313,12 +5313,12 @@
         <p:spPr>
           <a:xfrm>
             <a:off x="0" y="0"/>
-            <a:ext cx="12192000" cy="950990"/>
+            <a:ext cx="12274378" cy="593124"/>
           </a:xfrm>
         </p:spPr>
         <p:txBody>
           <a:bodyPr>
-            <a:normAutofit/>
+            <a:normAutofit fontScale="90000"/>
           </a:bodyPr>
           <a:lstStyle/>
           <a:p>
@@ -5458,7 +5458,7 @@
         </p:blipFill>
         <p:spPr>
           <a:xfrm>
-            <a:off x="266787" y="2892446"/>
+            <a:off x="277404" y="2106384"/>
             <a:ext cx="11637191" cy="3484508"/>
           </a:xfrm>
           <a:prstGeom prst="rect">
@@ -5610,12 +5610,12 @@
         <p:spPr>
           <a:xfrm>
             <a:off x="0" y="0"/>
-            <a:ext cx="12192000" cy="864973"/>
+            <a:ext cx="12192000" cy="576649"/>
           </a:xfrm>
         </p:spPr>
         <p:txBody>
           <a:bodyPr>
-            <a:normAutofit/>
+            <a:normAutofit fontScale="90000"/>
           </a:bodyPr>
           <a:lstStyle/>
           <a:p>
@@ -5755,7 +5755,7 @@
         </p:blipFill>
         <p:spPr>
           <a:xfrm>
-            <a:off x="328044" y="3020783"/>
+            <a:off x="266088" y="2234720"/>
             <a:ext cx="11659824" cy="3190875"/>
           </a:xfrm>
           <a:prstGeom prst="rect">
@@ -5895,12 +5895,12 @@
         <p:spPr>
           <a:xfrm>
             <a:off x="0" y="0"/>
-            <a:ext cx="12192000" cy="889686"/>
+            <a:ext cx="12192000" cy="551935"/>
           </a:xfrm>
         </p:spPr>
         <p:txBody>
           <a:bodyPr>
-            <a:normAutofit/>
+            <a:normAutofit fontScale="90000"/>
           </a:bodyPr>
           <a:lstStyle/>
           <a:p>
@@ -6040,7 +6040,7 @@
         </p:blipFill>
         <p:spPr>
           <a:xfrm>
-            <a:off x="254072" y="2651817"/>
+            <a:off x="250074" y="1825862"/>
             <a:ext cx="11691851" cy="3673978"/>
           </a:xfrm>
           <a:prstGeom prst="rect">
@@ -6056,7 +6056,7 @@
         </p:nvSpPr>
         <p:spPr>
           <a:xfrm>
-            <a:off x="350457" y="2057892"/>
+            <a:off x="391646" y="1456530"/>
             <a:ext cx="7340279" cy="369332"/>
           </a:xfrm>
           <a:prstGeom prst="rect">
@@ -6370,13 +6370,13 @@
         </p:nvSpPr>
         <p:spPr>
           <a:xfrm>
-            <a:off x="0" y="0"/>
-            <a:ext cx="12192000" cy="856735"/>
+            <a:off x="-1" y="1"/>
+            <a:ext cx="12257903" cy="626076"/>
           </a:xfrm>
         </p:spPr>
         <p:txBody>
           <a:bodyPr>
-            <a:normAutofit/>
+            <a:normAutofit fontScale="90000"/>
           </a:bodyPr>
           <a:lstStyle/>
           <a:p>
@@ -6515,7 +6515,7 @@
         </p:blipFill>
         <p:spPr>
           <a:xfrm>
-            <a:off x="198758" y="3020783"/>
+            <a:off x="247584" y="1818925"/>
             <a:ext cx="11696832" cy="3495675"/>
           </a:xfrm>
           <a:prstGeom prst="rect">
@@ -6531,7 +6531,7 @@
         </p:nvSpPr>
         <p:spPr>
           <a:xfrm>
-            <a:off x="350457" y="2009766"/>
+            <a:off x="490501" y="1449593"/>
             <a:ext cx="6915419" cy="369332"/>
           </a:xfrm>
           <a:prstGeom prst="rect">
@@ -6663,12 +6663,12 @@
         <p:spPr>
           <a:xfrm>
             <a:off x="0" y="0"/>
-            <a:ext cx="12192000" cy="840259"/>
+            <a:ext cx="12192000" cy="568411"/>
           </a:xfrm>
         </p:spPr>
         <p:txBody>
           <a:bodyPr>
-            <a:normAutofit/>
+            <a:normAutofit fontScale="90000"/>
           </a:bodyPr>
           <a:lstStyle/>
           <a:p>
@@ -6807,7 +6807,7 @@
         </p:blipFill>
         <p:spPr>
           <a:xfrm>
-            <a:off x="177654" y="2796193"/>
+            <a:off x="182504" y="1575693"/>
             <a:ext cx="11826992" cy="3772832"/>
           </a:xfrm>
           <a:prstGeom prst="rect">
@@ -6823,7 +6823,7 @@
         </p:nvSpPr>
         <p:spPr>
           <a:xfrm>
-            <a:off x="350457" y="1865388"/>
+            <a:off x="490500" y="1206361"/>
             <a:ext cx="8707640" cy="369332"/>
           </a:xfrm>
           <a:prstGeom prst="rect">
@@ -6971,12 +6971,12 @@
         <p:spPr>
           <a:xfrm>
             <a:off x="-1" y="0"/>
-            <a:ext cx="12192001" cy="889686"/>
+            <a:ext cx="12192002" cy="576649"/>
           </a:xfrm>
         </p:spPr>
         <p:txBody>
           <a:bodyPr>
-            <a:normAutofit/>
+            <a:normAutofit fontScale="90000"/>
           </a:bodyPr>
           <a:lstStyle/>
           <a:p>
@@ -7116,7 +7116,7 @@
         </p:blipFill>
         <p:spPr>
           <a:xfrm>
-            <a:off x="1" y="2091832"/>
+            <a:off x="-1" y="1387149"/>
             <a:ext cx="12192000" cy="4536591"/>
           </a:xfrm>
           <a:prstGeom prst="rect">
@@ -7132,7 +7132,7 @@
         </p:nvSpPr>
         <p:spPr>
           <a:xfrm>
-            <a:off x="322063" y="1561515"/>
+            <a:off x="536247" y="1017817"/>
             <a:ext cx="6188554" cy="369332"/>
           </a:xfrm>
           <a:prstGeom prst="rect">
@@ -7265,12 +7265,12 @@
         <p:spPr>
           <a:xfrm>
             <a:off x="0" y="0"/>
-            <a:ext cx="12192000" cy="930876"/>
+            <a:ext cx="12282616" cy="576649"/>
           </a:xfrm>
         </p:spPr>
         <p:txBody>
           <a:bodyPr>
-            <a:normAutofit/>
+            <a:normAutofit fontScale="90000"/>
           </a:bodyPr>
           <a:lstStyle/>
           <a:p>
@@ -7410,7 +7410,7 @@
         </p:blipFill>
         <p:spPr>
           <a:xfrm>
-            <a:off x="147848" y="2651814"/>
+            <a:off x="183915" y="1395292"/>
             <a:ext cx="11914786" cy="3929351"/>
           </a:xfrm>
           <a:prstGeom prst="rect">
@@ -7426,7 +7426,7 @@
         </p:nvSpPr>
         <p:spPr>
           <a:xfrm>
-            <a:off x="322063" y="1841506"/>
+            <a:off x="544485" y="1025960"/>
             <a:ext cx="4304448" cy="369332"/>
           </a:xfrm>
           <a:prstGeom prst="rect">
@@ -7583,13 +7583,13 @@
         </p:nvSpPr>
         <p:spPr>
           <a:xfrm>
-            <a:off x="0" y="0"/>
-            <a:ext cx="12192000" cy="840259"/>
+            <a:off x="-1" y="0"/>
+            <a:ext cx="12249665" cy="551935"/>
           </a:xfrm>
         </p:spPr>
         <p:txBody>
           <a:bodyPr>
-            <a:normAutofit/>
+            <a:normAutofit fontScale="90000"/>
           </a:bodyPr>
           <a:lstStyle/>
           <a:p>
@@ -7827,13 +7827,13 @@
         </p:nvSpPr>
         <p:spPr>
           <a:xfrm>
-            <a:off x="0" y="0"/>
-            <a:ext cx="12192000" cy="808835"/>
+            <a:off x="-1" y="1"/>
+            <a:ext cx="12257903" cy="473740"/>
           </a:xfrm>
         </p:spPr>
         <p:txBody>
           <a:bodyPr>
-            <a:normAutofit/>
+            <a:normAutofit fontScale="90000"/>
           </a:bodyPr>
           <a:lstStyle/>
           <a:p>
@@ -8433,13 +8433,13 @@
         </p:nvSpPr>
         <p:spPr>
           <a:xfrm>
-            <a:off x="0" y="0"/>
-            <a:ext cx="12192000" cy="963827"/>
+            <a:off x="0" y="1"/>
+            <a:ext cx="12192000" cy="527222"/>
           </a:xfrm>
         </p:spPr>
         <p:txBody>
           <a:bodyPr>
-            <a:normAutofit/>
+            <a:normAutofit fontScale="90000"/>
           </a:bodyPr>
           <a:lstStyle/>
           <a:p>
@@ -8704,12 +8704,12 @@
         <p:spPr>
           <a:xfrm>
             <a:off x="0" y="0"/>
-            <a:ext cx="12192000" cy="939114"/>
+            <a:ext cx="12192000" cy="568411"/>
           </a:xfrm>
         </p:spPr>
         <p:txBody>
           <a:bodyPr>
-            <a:normAutofit/>
+            <a:normAutofit fontScale="90000"/>
           </a:bodyPr>
           <a:lstStyle/>
           <a:p>
@@ -8896,13 +8896,13 @@
         </p:nvSpPr>
         <p:spPr>
           <a:xfrm>
-            <a:off x="0" y="0"/>
-            <a:ext cx="12192000" cy="947351"/>
+            <a:off x="0" y="1"/>
+            <a:ext cx="12192000" cy="584886"/>
           </a:xfrm>
         </p:spPr>
         <p:txBody>
           <a:bodyPr>
-            <a:normAutofit/>
+            <a:normAutofit fontScale="90000"/>
           </a:bodyPr>
           <a:lstStyle/>
           <a:p>
@@ -9006,13 +9006,6 @@
               </a:rPr>
               <a:t>.</a:t>
             </a:r>
-            <a:endParaRPr lang="en-US" sz="4000" b="1" dirty="0">
-              <a:solidFill>
-                <a:srgbClr val="7030A0"/>
-              </a:solidFill>
-              <a:latin typeface="Times New Roman" panose="02020603050405020304" pitchFamily="18" charset="0"/>
-              <a:cs typeface="Times New Roman" panose="02020603050405020304" pitchFamily="18" charset="0"/>
-            </a:endParaRPr>
           </a:p>
         </p:txBody>
       </p:sp>
@@ -9137,13 +9130,13 @@
         </p:nvSpPr>
         <p:spPr>
           <a:xfrm>
-            <a:off x="0" y="0"/>
-            <a:ext cx="12192000" cy="873211"/>
+            <a:off x="-1" y="0"/>
+            <a:ext cx="12249665" cy="535459"/>
           </a:xfrm>
         </p:spPr>
         <p:txBody>
           <a:bodyPr>
-            <a:normAutofit/>
+            <a:normAutofit fontScale="90000"/>
           </a:bodyPr>
           <a:lstStyle/>
           <a:p>
@@ -9155,47 +9148,17 @@
                 <a:latin typeface="Times New Roman" panose="02020603050405020304" pitchFamily="18" charset="0"/>
                 <a:cs typeface="Times New Roman" panose="02020603050405020304" pitchFamily="18" charset="0"/>
               </a:rPr>
-              <a:t>5. Chia </a:t>
-            </a:r>
-            <a:r>
-              <a:rPr lang="en-US" sz="4000" b="1" dirty="0" err="1" smtClean="0">
-                <a:solidFill>
-                  <a:srgbClr val="7030A0"/>
-                </a:solidFill>
-                <a:latin typeface="Times New Roman" panose="02020603050405020304" pitchFamily="18" charset="0"/>
-                <a:cs typeface="Times New Roman" panose="02020603050405020304" pitchFamily="18" charset="0"/>
-              </a:rPr>
-              <a:t>dữ</a:t>
-            </a:r>
-            <a:r>
-              <a:rPr lang="en-US" sz="4000" b="1" dirty="0" smtClean="0">
-                <a:solidFill>
-                  <a:srgbClr val="7030A0"/>
-                </a:solidFill>
-                <a:latin typeface="Times New Roman" panose="02020603050405020304" pitchFamily="18" charset="0"/>
-                <a:cs typeface="Times New Roman" panose="02020603050405020304" pitchFamily="18" charset="0"/>
-              </a:rPr>
-              <a:t> </a:t>
-            </a:r>
-            <a:r>
-              <a:rPr lang="en-US" sz="4000" b="1" dirty="0" err="1" smtClean="0">
-                <a:solidFill>
-                  <a:srgbClr val="7030A0"/>
-                </a:solidFill>
-                <a:latin typeface="Times New Roman" panose="02020603050405020304" pitchFamily="18" charset="0"/>
-                <a:cs typeface="Times New Roman" panose="02020603050405020304" pitchFamily="18" charset="0"/>
-              </a:rPr>
-              <a:t>liệu</a:t>
-            </a:r>
-            <a:r>
-              <a:rPr lang="en-US" sz="4000" b="1" dirty="0">
-                <a:solidFill>
-                  <a:srgbClr val="7030A0"/>
-                </a:solidFill>
-                <a:latin typeface="Times New Roman" panose="02020603050405020304" pitchFamily="18" charset="0"/>
-                <a:cs typeface="Times New Roman" panose="02020603050405020304" pitchFamily="18" charset="0"/>
-              </a:rPr>
-              <a:t>.</a:t>
+              <a:t>5. </a:t>
+            </a:r>
+            <a:r>
+              <a:rPr lang="en-US" sz="4000" b="1" dirty="0" smtClean="0">
+                <a:solidFill>
+                  <a:srgbClr val="7030A0"/>
+                </a:solidFill>
+                <a:latin typeface="Times New Roman" panose="02020603050405020304" pitchFamily="18" charset="0"/>
+                <a:cs typeface="Times New Roman" panose="02020603050405020304" pitchFamily="18" charset="0"/>
+              </a:rPr>
+              <a:t>Train, Test, Validation.</a:t>
             </a:r>
             <a:endParaRPr lang="en-US" sz="4000" b="1" dirty="0">
               <a:solidFill>
@@ -9281,12 +9244,12 @@
         <p:spPr>
           <a:xfrm>
             <a:off x="0" y="0"/>
-            <a:ext cx="12192000" cy="790832"/>
+            <a:ext cx="12192000" cy="510746"/>
           </a:xfrm>
         </p:spPr>
         <p:txBody>
           <a:bodyPr>
-            <a:normAutofit/>
+            <a:normAutofit fontScale="90000"/>
           </a:bodyPr>
           <a:lstStyle/>
           <a:p>
@@ -9473,13 +9436,13 @@
         </p:nvSpPr>
         <p:spPr>
           <a:xfrm>
-            <a:off x="0" y="0"/>
-            <a:ext cx="10007600" cy="1400530"/>
+            <a:off x="-1" y="0"/>
+            <a:ext cx="12126097" cy="550724"/>
           </a:xfrm>
         </p:spPr>
         <p:txBody>
           <a:bodyPr>
-            <a:normAutofit/>
+            <a:normAutofit fontScale="90000"/>
           </a:bodyPr>
           <a:lstStyle/>
           <a:p>
@@ -9521,17 +9484,7 @@
                 <a:latin typeface="Times New Roman" panose="02020603050405020304" pitchFamily="18" charset="0"/>
                 <a:cs typeface="Times New Roman" panose="02020603050405020304" pitchFamily="18" charset="0"/>
               </a:rPr>
-              <a:t> </a:t>
-            </a:r>
-            <a:r>
-              <a:rPr lang="en-US" sz="4000" b="1" dirty="0" smtClean="0">
-                <a:solidFill>
-                  <a:srgbClr val="7030A0"/>
-                </a:solidFill>
-                <a:latin typeface="Times New Roman" panose="02020603050405020304" pitchFamily="18" charset="0"/>
-                <a:cs typeface="Times New Roman" panose="02020603050405020304" pitchFamily="18" charset="0"/>
-              </a:rPr>
-              <a:t>Perceptron.</a:t>
+              <a:t> Perceptron.</a:t>
             </a:r>
             <a:endParaRPr lang="en-US" sz="4000" b="1" dirty="0">
               <a:solidFill>
@@ -9615,11 +9568,7 @@
           <a:p>
             <a:r>
               <a:rPr lang="en-US" dirty="0" smtClean="0"/>
-              <a:t>Input </a:t>
-            </a:r>
-            <a:r>
-              <a:rPr lang="en-US" dirty="0" smtClean="0"/>
-              <a:t>500 neurons, </a:t>
+              <a:t>Input 500 neurons, </a:t>
             </a:r>
             <a:r>
               <a:rPr lang="en-US" dirty="0" err="1"/>
@@ -9651,11 +9600,7 @@
           <a:p>
             <a:r>
               <a:rPr lang="en-US" dirty="0" smtClean="0"/>
-              <a:t>Output 2 neuron (sigmoid</a:t>
-            </a:r>
-            <a:r>
-              <a:rPr lang="en-US" dirty="0" smtClean="0"/>
-              <a:t>)</a:t>
+              <a:t>Output 2 neuron (sigmoid)</a:t>
             </a:r>
           </a:p>
           <a:p>
@@ -9815,17 +9760,7 @@
                 <a:latin typeface="Times New Roman" panose="02020603050405020304" pitchFamily="18" charset="0"/>
                 <a:cs typeface="Times New Roman" panose="02020603050405020304" pitchFamily="18" charset="0"/>
               </a:rPr>
-              <a:t> </a:t>
-            </a:r>
-            <a:r>
-              <a:rPr lang="en-US" sz="4000" b="1" dirty="0" smtClean="0">
-                <a:solidFill>
-                  <a:srgbClr val="7030A0"/>
-                </a:solidFill>
-                <a:latin typeface="Times New Roman" panose="02020603050405020304" pitchFamily="18" charset="0"/>
-                <a:cs typeface="Times New Roman" panose="02020603050405020304" pitchFamily="18" charset="0"/>
-              </a:rPr>
-              <a:t>Perceptron: </a:t>
+              <a:t> Perceptron: </a:t>
             </a:r>
             <a:r>
               <a:rPr lang="en-US" sz="4000" b="1" dirty="0" err="1" smtClean="0">
@@ -10433,17 +10368,7 @@
                 <a:latin typeface="Times New Roman" panose="02020603050405020304" pitchFamily="18" charset="0"/>
                 <a:cs typeface="Times New Roman" panose="02020603050405020304" pitchFamily="18" charset="0"/>
               </a:rPr>
-              <a:t> </a:t>
-            </a:r>
-            <a:r>
-              <a:rPr lang="en-US" sz="4000" b="1" dirty="0" smtClean="0">
-                <a:solidFill>
-                  <a:srgbClr val="7030A0"/>
-                </a:solidFill>
-                <a:latin typeface="Times New Roman" panose="02020603050405020304" pitchFamily="18" charset="0"/>
-                <a:cs typeface="Times New Roman" panose="02020603050405020304" pitchFamily="18" charset="0"/>
-              </a:rPr>
-              <a:t>Perceptron: </a:t>
+              <a:t> Perceptron: </a:t>
             </a:r>
             <a:r>
               <a:rPr lang="en-US" sz="4000" b="1" dirty="0" err="1" smtClean="0">
@@ -10644,13 +10569,13 @@
         </p:nvSpPr>
         <p:spPr>
           <a:xfrm>
-            <a:off x="0" y="0"/>
-            <a:ext cx="12192000" cy="840259"/>
+            <a:off x="0" y="1"/>
+            <a:ext cx="12282616" cy="601362"/>
           </a:xfrm>
         </p:spPr>
         <p:txBody>
           <a:bodyPr>
-            <a:normAutofit/>
+            <a:normAutofit fontScale="90000"/>
           </a:bodyPr>
           <a:lstStyle/>
           <a:p>
@@ -10692,17 +10617,7 @@
                 <a:latin typeface="Times New Roman" panose="02020603050405020304" pitchFamily="18" charset="0"/>
                 <a:cs typeface="Times New Roman" panose="02020603050405020304" pitchFamily="18" charset="0"/>
               </a:rPr>
-              <a:t> </a:t>
-            </a:r>
-            <a:r>
-              <a:rPr lang="en-US" sz="4000" b="1" dirty="0" smtClean="0">
-                <a:solidFill>
-                  <a:srgbClr val="7030A0"/>
-                </a:solidFill>
-                <a:latin typeface="Times New Roman" panose="02020603050405020304" pitchFamily="18" charset="0"/>
-                <a:cs typeface="Times New Roman" panose="02020603050405020304" pitchFamily="18" charset="0"/>
-              </a:rPr>
-              <a:t>Perceptron: </a:t>
+              <a:t> Perceptron: </a:t>
             </a:r>
             <a:r>
               <a:rPr lang="en-US" sz="4000" b="1" dirty="0" err="1" smtClean="0">
@@ -10964,17 +10879,7 @@
                 <a:latin typeface="Times New Roman" panose="02020603050405020304" pitchFamily="18" charset="0"/>
                 <a:cs typeface="Times New Roman" panose="02020603050405020304" pitchFamily="18" charset="0"/>
               </a:rPr>
-              <a:t> </a:t>
-            </a:r>
-            <a:r>
-              <a:rPr lang="en-US" sz="4000" b="1" dirty="0" smtClean="0">
-                <a:solidFill>
-                  <a:srgbClr val="7030A0"/>
-                </a:solidFill>
-                <a:latin typeface="Times New Roman" panose="02020603050405020304" pitchFamily="18" charset="0"/>
-                <a:cs typeface="Times New Roman" panose="02020603050405020304" pitchFamily="18" charset="0"/>
-              </a:rPr>
-              <a:t>Perceptron: </a:t>
+              <a:t> Perceptron: </a:t>
             </a:r>
             <a:r>
               <a:rPr lang="en-US" sz="4000" b="1" dirty="0" err="1" smtClean="0">
@@ -11703,8 +11608,8 @@
         </p:nvSpPr>
         <p:spPr>
           <a:xfrm>
-            <a:off x="0" y="0"/>
-            <a:ext cx="12274378" cy="766119"/>
+            <a:off x="0" y="1"/>
+            <a:ext cx="12109622" cy="716692"/>
           </a:xfrm>
         </p:spPr>
         <p:txBody>
@@ -11751,17 +11656,7 @@
                 <a:latin typeface="Times New Roman" panose="02020603050405020304" pitchFamily="18" charset="0"/>
                 <a:cs typeface="Times New Roman" panose="02020603050405020304" pitchFamily="18" charset="0"/>
               </a:rPr>
-              <a:t> </a:t>
-            </a:r>
-            <a:r>
-              <a:rPr lang="en-US" sz="4000" b="1" dirty="0" smtClean="0">
-                <a:solidFill>
-                  <a:srgbClr val="7030A0"/>
-                </a:solidFill>
-                <a:latin typeface="Times New Roman" panose="02020603050405020304" pitchFamily="18" charset="0"/>
-                <a:cs typeface="Times New Roman" panose="02020603050405020304" pitchFamily="18" charset="0"/>
-              </a:rPr>
-              <a:t>Perceptron: </a:t>
+              <a:t> Perceptron: </a:t>
             </a:r>
             <a:r>
               <a:rPr lang="en-US" sz="4000" b="1" dirty="0" err="1" smtClean="0">
@@ -11983,12 +11878,12 @@
         <p:spPr>
           <a:xfrm>
             <a:off x="0" y="0"/>
-            <a:ext cx="12192000" cy="840259"/>
+            <a:ext cx="12282616" cy="560173"/>
           </a:xfrm>
         </p:spPr>
         <p:txBody>
           <a:bodyPr>
-            <a:normAutofit/>
+            <a:normAutofit fontScale="90000"/>
           </a:bodyPr>
           <a:lstStyle/>
           <a:p>
@@ -12030,17 +11925,7 @@
                 <a:latin typeface="Times New Roman" panose="02020603050405020304" pitchFamily="18" charset="0"/>
                 <a:cs typeface="Times New Roman" panose="02020603050405020304" pitchFamily="18" charset="0"/>
               </a:rPr>
-              <a:t> </a:t>
-            </a:r>
-            <a:r>
-              <a:rPr lang="en-US" sz="4000" b="1" dirty="0" smtClean="0">
-                <a:solidFill>
-                  <a:srgbClr val="7030A0"/>
-                </a:solidFill>
-                <a:latin typeface="Times New Roman" panose="02020603050405020304" pitchFamily="18" charset="0"/>
-                <a:cs typeface="Times New Roman" panose="02020603050405020304" pitchFamily="18" charset="0"/>
-              </a:rPr>
-              <a:t>Perceptron: </a:t>
+              <a:t> Perceptron: </a:t>
             </a:r>
             <a:r>
               <a:rPr lang="en-US" sz="4000" b="1" dirty="0" err="1" smtClean="0">
@@ -12322,17 +12207,7 @@
                 <a:latin typeface="Times New Roman" panose="02020603050405020304" pitchFamily="18" charset="0"/>
                 <a:cs typeface="Times New Roman" panose="02020603050405020304" pitchFamily="18" charset="0"/>
               </a:rPr>
-              <a:t> </a:t>
-            </a:r>
-            <a:r>
-              <a:rPr lang="en-US" sz="4000" b="1" dirty="0" smtClean="0">
-                <a:solidFill>
-                  <a:srgbClr val="7030A0"/>
-                </a:solidFill>
-                <a:latin typeface="Times New Roman" panose="02020603050405020304" pitchFamily="18" charset="0"/>
-                <a:cs typeface="Times New Roman" panose="02020603050405020304" pitchFamily="18" charset="0"/>
-              </a:rPr>
-              <a:t>Perceptron: sigmoid - sigmoid.</a:t>
+              <a:t> Perceptron: sigmoid - sigmoid.</a:t>
             </a:r>
             <a:endParaRPr lang="en-US" sz="4000" b="1" dirty="0">
               <a:solidFill>
@@ -13066,13 +12941,13 @@
         </p:nvSpPr>
         <p:spPr>
           <a:xfrm>
-            <a:off x="0" y="0"/>
-            <a:ext cx="12274378" cy="766119"/>
+            <a:off x="0" y="1"/>
+            <a:ext cx="12192000" cy="626076"/>
           </a:xfrm>
         </p:spPr>
         <p:txBody>
           <a:bodyPr>
-            <a:normAutofit/>
+            <a:normAutofit fontScale="90000"/>
           </a:bodyPr>
           <a:lstStyle/>
           <a:p>
@@ -13114,17 +12989,7 @@
                 <a:latin typeface="Times New Roman" panose="02020603050405020304" pitchFamily="18" charset="0"/>
                 <a:cs typeface="Times New Roman" panose="02020603050405020304" pitchFamily="18" charset="0"/>
               </a:rPr>
-              <a:t> </a:t>
-            </a:r>
-            <a:r>
-              <a:rPr lang="en-US" sz="4000" b="1" dirty="0" smtClean="0">
-                <a:solidFill>
-                  <a:srgbClr val="7030A0"/>
-                </a:solidFill>
-                <a:latin typeface="Times New Roman" panose="02020603050405020304" pitchFamily="18" charset="0"/>
-                <a:cs typeface="Times New Roman" panose="02020603050405020304" pitchFamily="18" charset="0"/>
-              </a:rPr>
-              <a:t>Perceptron: sigmoid - sigmoid.</a:t>
+              <a:t> Perceptron: sigmoid - sigmoid.</a:t>
             </a:r>
             <a:endParaRPr lang="en-US" sz="4000" b="1" dirty="0">
               <a:solidFill>
@@ -13305,13 +13170,13 @@
         </p:nvSpPr>
         <p:spPr>
           <a:xfrm>
-            <a:off x="0" y="0"/>
-            <a:ext cx="12192000" cy="840259"/>
+            <a:off x="0" y="1"/>
+            <a:ext cx="12192000" cy="593124"/>
           </a:xfrm>
         </p:spPr>
         <p:txBody>
           <a:bodyPr>
-            <a:normAutofit/>
+            <a:normAutofit fontScale="90000"/>
           </a:bodyPr>
           <a:lstStyle/>
           <a:p>
@@ -13353,17 +13218,7 @@
                 <a:latin typeface="Times New Roman" panose="02020603050405020304" pitchFamily="18" charset="0"/>
                 <a:cs typeface="Times New Roman" panose="02020603050405020304" pitchFamily="18" charset="0"/>
               </a:rPr>
-              <a:t> </a:t>
-            </a:r>
-            <a:r>
-              <a:rPr lang="en-US" sz="4000" b="1" dirty="0" smtClean="0">
-                <a:solidFill>
-                  <a:srgbClr val="7030A0"/>
-                </a:solidFill>
-                <a:latin typeface="Times New Roman" panose="02020603050405020304" pitchFamily="18" charset="0"/>
-                <a:cs typeface="Times New Roman" panose="02020603050405020304" pitchFamily="18" charset="0"/>
-              </a:rPr>
-              <a:t>Perceptron: sigmoid - sigmoid.</a:t>
+              <a:t> Perceptron: sigmoid - sigmoid.</a:t>
             </a:r>
             <a:endParaRPr lang="en-US" sz="4000" b="1" dirty="0">
               <a:solidFill>
@@ -13558,12 +13413,12 @@
         <p:spPr>
           <a:xfrm>
             <a:off x="0" y="0"/>
-            <a:ext cx="12192000" cy="807308"/>
+            <a:ext cx="12192000" cy="543697"/>
           </a:xfrm>
         </p:spPr>
         <p:txBody>
           <a:bodyPr>
-            <a:normAutofit/>
+            <a:normAutofit fontScale="90000"/>
           </a:bodyPr>
           <a:lstStyle/>
           <a:p>
@@ -13777,17 +13632,7 @@
                 <a:latin typeface="Times New Roman" panose="02020603050405020304" pitchFamily="18" charset="0"/>
                 <a:cs typeface="Times New Roman" panose="02020603050405020304" pitchFamily="18" charset="0"/>
               </a:rPr>
-              <a:t>. </a:t>
-            </a:r>
-            <a:r>
-              <a:rPr lang="en-US" sz="4000" b="1" dirty="0" smtClean="0">
-                <a:solidFill>
-                  <a:srgbClr val="7030A0"/>
-                </a:solidFill>
-                <a:latin typeface="Times New Roman" panose="02020603050405020304" pitchFamily="18" charset="0"/>
-                <a:cs typeface="Times New Roman" panose="02020603050405020304" pitchFamily="18" charset="0"/>
-              </a:rPr>
-              <a:t>Logistic Regression.</a:t>
+              <a:t>. Logistic Regression.</a:t>
             </a:r>
             <a:endParaRPr lang="en-US" sz="4000" b="1" dirty="0">
               <a:solidFill>
@@ -13984,27 +13829,7 @@
                 <a:latin typeface="Times New Roman" panose="02020603050405020304" pitchFamily="18" charset="0"/>
                 <a:cs typeface="Times New Roman" panose="02020603050405020304" pitchFamily="18" charset="0"/>
               </a:rPr>
-              <a:t>. </a:t>
-            </a:r>
-            <a:r>
-              <a:rPr lang="en-US" sz="4000" b="1" dirty="0" smtClean="0">
-                <a:solidFill>
-                  <a:srgbClr val="7030A0"/>
-                </a:solidFill>
-                <a:latin typeface="Times New Roman" panose="02020603050405020304" pitchFamily="18" charset="0"/>
-                <a:cs typeface="Times New Roman" panose="02020603050405020304" pitchFamily="18" charset="0"/>
-              </a:rPr>
-              <a:t>k-Nearest </a:t>
-            </a:r>
-            <a:r>
-              <a:rPr lang="en-US" sz="4000" b="1" dirty="0" smtClean="0">
-                <a:solidFill>
-                  <a:srgbClr val="7030A0"/>
-                </a:solidFill>
-                <a:latin typeface="Times New Roman" panose="02020603050405020304" pitchFamily="18" charset="0"/>
-                <a:cs typeface="Times New Roman" panose="02020603050405020304" pitchFamily="18" charset="0"/>
-              </a:rPr>
-              <a:t>Neighbors.</a:t>
+              <a:t>. k-Nearest Neighbors.</a:t>
             </a:r>
             <a:endParaRPr lang="en-US" sz="4000" b="1" dirty="0">
               <a:solidFill>
@@ -14191,17 +14016,7 @@
                 <a:latin typeface="Times New Roman" panose="02020603050405020304" pitchFamily="18" charset="0"/>
                 <a:cs typeface="Times New Roman" panose="02020603050405020304" pitchFamily="18" charset="0"/>
               </a:rPr>
-              <a:t>9</a:t>
-            </a:r>
-            <a:r>
-              <a:rPr lang="en-US" sz="4000" b="1" dirty="0" smtClean="0">
-                <a:solidFill>
-                  <a:srgbClr val="7030A0"/>
-                </a:solidFill>
-                <a:latin typeface="Times New Roman" panose="02020603050405020304" pitchFamily="18" charset="0"/>
-                <a:cs typeface="Times New Roman" panose="02020603050405020304" pitchFamily="18" charset="0"/>
-              </a:rPr>
-              <a:t>.1 </a:t>
+              <a:t>9.1 </a:t>
             </a:r>
             <a:r>
               <a:rPr lang="en-US" sz="4000" b="1" dirty="0" err="1" smtClean="0">
@@ -14408,27 +14223,7 @@
                 <a:latin typeface="Times New Roman" panose="02020603050405020304" pitchFamily="18" charset="0"/>
                 <a:cs typeface="Times New Roman" panose="02020603050405020304" pitchFamily="18" charset="0"/>
               </a:rPr>
-              <a:t>9</a:t>
-            </a:r>
-            <a:r>
-              <a:rPr lang="en-US" sz="4000" b="1" dirty="0" smtClean="0">
-                <a:solidFill>
-                  <a:srgbClr val="7030A0"/>
-                </a:solidFill>
-                <a:latin typeface="Times New Roman" panose="02020603050405020304" pitchFamily="18" charset="0"/>
-                <a:cs typeface="Times New Roman" panose="02020603050405020304" pitchFamily="18" charset="0"/>
-              </a:rPr>
-              <a:t>.2 </a:t>
-            </a:r>
-            <a:r>
-              <a:rPr lang="en-US" sz="4000" b="1" dirty="0" smtClean="0">
-                <a:solidFill>
-                  <a:srgbClr val="7030A0"/>
-                </a:solidFill>
-                <a:latin typeface="Times New Roman" panose="02020603050405020304" pitchFamily="18" charset="0"/>
-                <a:cs typeface="Times New Roman" panose="02020603050405020304" pitchFamily="18" charset="0"/>
-              </a:rPr>
-              <a:t>Complement Naïve Bayes.</a:t>
+              <a:t>9.2 Complement Naïve Bayes.</a:t>
             </a:r>
             <a:endParaRPr lang="en-US" sz="4000" b="1" dirty="0">
               <a:solidFill>
@@ -14615,27 +14410,7 @@
                 <a:latin typeface="Times New Roman" panose="02020603050405020304" pitchFamily="18" charset="0"/>
                 <a:cs typeface="Times New Roman" panose="02020603050405020304" pitchFamily="18" charset="0"/>
               </a:rPr>
-              <a:t>9</a:t>
-            </a:r>
-            <a:r>
-              <a:rPr lang="en-US" sz="4000" b="1" dirty="0" smtClean="0">
-                <a:solidFill>
-                  <a:srgbClr val="7030A0"/>
-                </a:solidFill>
-                <a:latin typeface="Times New Roman" panose="02020603050405020304" pitchFamily="18" charset="0"/>
-                <a:cs typeface="Times New Roman" panose="02020603050405020304" pitchFamily="18" charset="0"/>
-              </a:rPr>
-              <a:t>.3 </a:t>
-            </a:r>
-            <a:r>
-              <a:rPr lang="en-US" sz="4000" b="1" dirty="0" smtClean="0">
-                <a:solidFill>
-                  <a:srgbClr val="7030A0"/>
-                </a:solidFill>
-                <a:latin typeface="Times New Roman" panose="02020603050405020304" pitchFamily="18" charset="0"/>
-                <a:cs typeface="Times New Roman" panose="02020603050405020304" pitchFamily="18" charset="0"/>
-              </a:rPr>
-              <a:t>Bernoulli Naïve Bayes.</a:t>
+              <a:t>9.3 Bernoulli Naïve Bayes.</a:t>
             </a:r>
             <a:endParaRPr lang="en-US" sz="4000" b="1" dirty="0">
               <a:solidFill>
@@ -14832,17 +14607,7 @@
                 <a:latin typeface="Times New Roman" panose="02020603050405020304" pitchFamily="18" charset="0"/>
                 <a:cs typeface="Times New Roman" panose="02020603050405020304" pitchFamily="18" charset="0"/>
               </a:rPr>
-              <a:t>. </a:t>
-            </a:r>
-            <a:r>
-              <a:rPr lang="en-US" sz="4000" b="1" dirty="0" smtClean="0">
-                <a:solidFill>
-                  <a:srgbClr val="7030A0"/>
-                </a:solidFill>
-                <a:latin typeface="Times New Roman" panose="02020603050405020304" pitchFamily="18" charset="0"/>
-                <a:cs typeface="Times New Roman" panose="02020603050405020304" pitchFamily="18" charset="0"/>
-              </a:rPr>
-              <a:t>SVM: up sample.</a:t>
+              <a:t>. SVM: up sample.</a:t>
             </a:r>
             <a:endParaRPr lang="en-US" sz="4000" b="1" dirty="0">
               <a:solidFill>
@@ -15118,17 +14883,7 @@
                 <a:latin typeface="Times New Roman" panose="02020603050405020304" pitchFamily="18" charset="0"/>
                 <a:cs typeface="Times New Roman" panose="02020603050405020304" pitchFamily="18" charset="0"/>
               </a:rPr>
-              <a:t>. </a:t>
-            </a:r>
-            <a:r>
-              <a:rPr lang="en-US" sz="4000" b="1" dirty="0" smtClean="0">
-                <a:solidFill>
-                  <a:srgbClr val="7030A0"/>
-                </a:solidFill>
-                <a:latin typeface="Times New Roman" panose="02020603050405020304" pitchFamily="18" charset="0"/>
-                <a:cs typeface="Times New Roman" panose="02020603050405020304" pitchFamily="18" charset="0"/>
-              </a:rPr>
-              <a:t>SVM: down sample.</a:t>
+              <a:t>. SVM: down sample.</a:t>
             </a:r>
             <a:endParaRPr lang="en-US" sz="4000" b="1" dirty="0">
               <a:solidFill>
@@ -15452,17 +15207,7 @@
                 <a:latin typeface="Times New Roman" panose="02020603050405020304" pitchFamily="18" charset="0"/>
                 <a:cs typeface="Times New Roman" panose="02020603050405020304" pitchFamily="18" charset="0"/>
               </a:rPr>
-              <a:t>. </a:t>
-            </a:r>
-            <a:r>
-              <a:rPr lang="en-US" sz="4000" b="1" dirty="0" smtClean="0">
-                <a:solidFill>
-                  <a:srgbClr val="7030A0"/>
-                </a:solidFill>
-                <a:latin typeface="Times New Roman" panose="02020603050405020304" pitchFamily="18" charset="0"/>
-                <a:cs typeface="Times New Roman" panose="02020603050405020304" pitchFamily="18" charset="0"/>
-              </a:rPr>
-              <a:t>Overfitting.</a:t>
+              <a:t>. Overfitting.</a:t>
             </a:r>
             <a:endParaRPr lang="en-US" sz="4000" b="1" dirty="0">
               <a:solidFill>
@@ -15542,8 +15287,8 @@
         </p:nvSpPr>
         <p:spPr>
           <a:xfrm>
-            <a:off x="320843" y="1400530"/>
-            <a:ext cx="8069178" cy="646331"/>
+            <a:off x="320842" y="1400530"/>
+            <a:ext cx="11253319" cy="369332"/>
           </a:xfrm>
           <a:prstGeom prst="rect">
             <a:avLst/>
@@ -15583,40 +15328,110 @@
                 <a:latin typeface="Times New Roman" panose="02020603050405020304" pitchFamily="18" charset="0"/>
                 <a:cs typeface="Times New Roman" panose="02020603050405020304" pitchFamily="18" charset="0"/>
               </a:rPr>
-              <a:t>mô hình </a:t>
-            </a:r>
-            <a:r>
-              <a:rPr lang="vi-VN" i="1" dirty="0">
+              <a:t>mô hình quá fit với dữ </a:t>
+            </a:r>
+            <a:r>
+              <a:rPr lang="vi-VN" dirty="0" smtClean="0">
                 <a:solidFill>
                   <a:srgbClr val="000000"/>
                 </a:solidFill>
                 <a:latin typeface="Times New Roman" panose="02020603050405020304" pitchFamily="18" charset="0"/>
                 <a:cs typeface="Times New Roman" panose="02020603050405020304" pitchFamily="18" charset="0"/>
               </a:rPr>
-              <a:t>quá fit</a:t>
-            </a:r>
-            <a:r>
-              <a:rPr lang="vi-VN" dirty="0">
+              <a:t>liệu</a:t>
+            </a:r>
+            <a:r>
+              <a:rPr lang="en-US" dirty="0">
                 <a:solidFill>
                   <a:srgbClr val="000000"/>
                 </a:solidFill>
                 <a:latin typeface="Times New Roman" panose="02020603050405020304" pitchFamily="18" charset="0"/>
                 <a:cs typeface="Times New Roman" panose="02020603050405020304" pitchFamily="18" charset="0"/>
               </a:rPr>
-              <a:t> với dữ </a:t>
-            </a:r>
-            <a:r>
-              <a:rPr lang="vi-VN" dirty="0" smtClean="0">
+              <a:t> </a:t>
+            </a:r>
+            <a:r>
+              <a:rPr lang="en-US" dirty="0" smtClean="0">
                 <a:solidFill>
                   <a:srgbClr val="000000"/>
                 </a:solidFill>
                 <a:latin typeface="Times New Roman" panose="02020603050405020304" pitchFamily="18" charset="0"/>
                 <a:cs typeface="Times New Roman" panose="02020603050405020304" pitchFamily="18" charset="0"/>
               </a:rPr>
+              <a:t>training, </a:t>
+            </a:r>
+            <a:r>
+              <a:rPr lang="en-US" dirty="0" err="1" smtClean="0">
+                <a:solidFill>
+                  <a:srgbClr val="000000"/>
+                </a:solidFill>
+                <a:latin typeface="Times New Roman" panose="02020603050405020304" pitchFamily="18" charset="0"/>
+                <a:cs typeface="Times New Roman" panose="02020603050405020304" pitchFamily="18" charset="0"/>
+              </a:rPr>
+              <a:t>khi</a:t>
+            </a:r>
+            <a:r>
+              <a:rPr lang="en-US" dirty="0" smtClean="0">
+                <a:solidFill>
+                  <a:srgbClr val="000000"/>
+                </a:solidFill>
+                <a:latin typeface="Times New Roman" panose="02020603050405020304" pitchFamily="18" charset="0"/>
+                <a:cs typeface="Times New Roman" panose="02020603050405020304" pitchFamily="18" charset="0"/>
+              </a:rPr>
+              <a:t> </a:t>
+            </a:r>
+            <a:r>
+              <a:rPr lang="en-US" dirty="0" err="1" smtClean="0">
+                <a:solidFill>
+                  <a:srgbClr val="000000"/>
+                </a:solidFill>
+                <a:latin typeface="Times New Roman" panose="02020603050405020304" pitchFamily="18" charset="0"/>
+                <a:cs typeface="Times New Roman" panose="02020603050405020304" pitchFamily="18" charset="0"/>
+              </a:rPr>
+              <a:t>gặp</a:t>
+            </a:r>
+            <a:r>
+              <a:rPr lang="en-US" dirty="0" smtClean="0">
+                <a:solidFill>
+                  <a:srgbClr val="000000"/>
+                </a:solidFill>
+                <a:latin typeface="Times New Roman" panose="02020603050405020304" pitchFamily="18" charset="0"/>
+                <a:cs typeface="Times New Roman" panose="02020603050405020304" pitchFamily="18" charset="0"/>
+              </a:rPr>
+              <a:t> </a:t>
+            </a:r>
+            <a:r>
+              <a:rPr lang="en-US" dirty="0" err="1" smtClean="0">
+                <a:solidFill>
+                  <a:srgbClr val="000000"/>
+                </a:solidFill>
+                <a:latin typeface="Times New Roman" panose="02020603050405020304" pitchFamily="18" charset="0"/>
+                <a:cs typeface="Times New Roman" panose="02020603050405020304" pitchFamily="18" charset="0"/>
+              </a:rPr>
+              <a:t>dữ</a:t>
+            </a:r>
+            <a:r>
+              <a:rPr lang="en-US" dirty="0" smtClean="0">
+                <a:solidFill>
+                  <a:srgbClr val="000000"/>
+                </a:solidFill>
+                <a:latin typeface="Times New Roman" panose="02020603050405020304" pitchFamily="18" charset="0"/>
+                <a:cs typeface="Times New Roman" panose="02020603050405020304" pitchFamily="18" charset="0"/>
+              </a:rPr>
+              <a:t> </a:t>
+            </a:r>
+            <a:r>
+              <a:rPr lang="en-US" dirty="0" err="1" smtClean="0">
+                <a:solidFill>
+                  <a:srgbClr val="000000"/>
+                </a:solidFill>
+                <a:latin typeface="Times New Roman" panose="02020603050405020304" pitchFamily="18" charset="0"/>
+                <a:cs typeface="Times New Roman" panose="02020603050405020304" pitchFamily="18" charset="0"/>
+              </a:rPr>
               <a:t>liệu</a:t>
             </a:r>
             <a:r>
-              <a:rPr lang="en-US" dirty="0">
+              <a:rPr lang="en-US" dirty="0" smtClean="0">
                 <a:solidFill>
                   <a:srgbClr val="000000"/>
                 </a:solidFill>
@@ -15633,87 +15448,17 @@
                 <a:latin typeface="Times New Roman" panose="02020603050405020304" pitchFamily="18" charset="0"/>
                 <a:cs typeface="Times New Roman" panose="02020603050405020304" pitchFamily="18" charset="0"/>
               </a:rPr>
-              <a:t>training, </a:t>
-            </a:r>
-            <a:r>
-              <a:rPr lang="en-US" dirty="0" err="1" smtClean="0">
+              <a:t>unseen</a:t>
+            </a:r>
+            <a:r>
+              <a:rPr lang="en-US" dirty="0" smtClean="0">
                 <a:solidFill>
                   <a:srgbClr val="000000"/>
                 </a:solidFill>
                 <a:latin typeface="Times New Roman" panose="02020603050405020304" pitchFamily="18" charset="0"/>
                 <a:cs typeface="Times New Roman" panose="02020603050405020304" pitchFamily="18" charset="0"/>
               </a:rPr>
-              <a:t>khi</a:t>
-            </a:r>
-            <a:r>
-              <a:rPr lang="en-US" dirty="0" smtClean="0">
-                <a:solidFill>
-                  <a:srgbClr val="000000"/>
-                </a:solidFill>
-                <a:latin typeface="Times New Roman" panose="02020603050405020304" pitchFamily="18" charset="0"/>
-                <a:cs typeface="Times New Roman" panose="02020603050405020304" pitchFamily="18" charset="0"/>
-              </a:rPr>
-              <a:t> </a:t>
-            </a:r>
-            <a:r>
-              <a:rPr lang="en-US" dirty="0" err="1" smtClean="0">
-                <a:solidFill>
-                  <a:srgbClr val="000000"/>
-                </a:solidFill>
-                <a:latin typeface="Times New Roman" panose="02020603050405020304" pitchFamily="18" charset="0"/>
-                <a:cs typeface="Times New Roman" panose="02020603050405020304" pitchFamily="18" charset="0"/>
-              </a:rPr>
-              <a:t>gặp</a:t>
-            </a:r>
-            <a:r>
-              <a:rPr lang="en-US" dirty="0" smtClean="0">
-                <a:solidFill>
-                  <a:srgbClr val="000000"/>
-                </a:solidFill>
-                <a:latin typeface="Times New Roman" panose="02020603050405020304" pitchFamily="18" charset="0"/>
-                <a:cs typeface="Times New Roman" panose="02020603050405020304" pitchFamily="18" charset="0"/>
-              </a:rPr>
-              <a:t> </a:t>
-            </a:r>
-            <a:r>
-              <a:rPr lang="en-US" dirty="0" err="1" smtClean="0">
-                <a:solidFill>
-                  <a:srgbClr val="000000"/>
-                </a:solidFill>
-                <a:latin typeface="Times New Roman" panose="02020603050405020304" pitchFamily="18" charset="0"/>
-                <a:cs typeface="Times New Roman" panose="02020603050405020304" pitchFamily="18" charset="0"/>
-              </a:rPr>
-              <a:t>dữ</a:t>
-            </a:r>
-            <a:r>
-              <a:rPr lang="en-US" dirty="0" smtClean="0">
-                <a:solidFill>
-                  <a:srgbClr val="000000"/>
-                </a:solidFill>
-                <a:latin typeface="Times New Roman" panose="02020603050405020304" pitchFamily="18" charset="0"/>
-                <a:cs typeface="Times New Roman" panose="02020603050405020304" pitchFamily="18" charset="0"/>
-              </a:rPr>
-              <a:t> </a:t>
-            </a:r>
-            <a:r>
-              <a:rPr lang="en-US" dirty="0" err="1" smtClean="0">
-                <a:solidFill>
-                  <a:srgbClr val="000000"/>
-                </a:solidFill>
-                <a:latin typeface="Times New Roman" panose="02020603050405020304" pitchFamily="18" charset="0"/>
-                <a:cs typeface="Times New Roman" panose="02020603050405020304" pitchFamily="18" charset="0"/>
-              </a:rPr>
-              <a:t>liệu</a:t>
-            </a:r>
-            <a:r>
-              <a:rPr lang="en-US" dirty="0" smtClean="0">
-                <a:solidFill>
-                  <a:srgbClr val="000000"/>
-                </a:solidFill>
-                <a:latin typeface="Times New Roman" panose="02020603050405020304" pitchFamily="18" charset="0"/>
-                <a:cs typeface="Times New Roman" panose="02020603050405020304" pitchFamily="18" charset="0"/>
-              </a:rPr>
-              <a:t> unseen, </a:t>
+              <a:t>, </a:t>
             </a:r>
             <a:r>
               <a:rPr lang="en-US" dirty="0" err="1" smtClean="0">
@@ -15935,17 +15680,7 @@
                 <a:latin typeface="Times New Roman" panose="02020603050405020304" pitchFamily="18" charset="0"/>
                 <a:cs typeface="Times New Roman" panose="02020603050405020304" pitchFamily="18" charset="0"/>
               </a:rPr>
-              <a:t>. </a:t>
-            </a:r>
-            <a:r>
-              <a:rPr lang="en-US" sz="4000" b="1" dirty="0" smtClean="0">
-                <a:solidFill>
-                  <a:srgbClr val="7030A0"/>
-                </a:solidFill>
-                <a:latin typeface="Times New Roman" panose="02020603050405020304" pitchFamily="18" charset="0"/>
-                <a:cs typeface="Times New Roman" panose="02020603050405020304" pitchFamily="18" charset="0"/>
-              </a:rPr>
-              <a:t>Overfitting.</a:t>
+              <a:t>. Overfitting.</a:t>
             </a:r>
             <a:endParaRPr lang="en-US" sz="4000" b="1" dirty="0">
               <a:solidFill>
@@ -16064,17 +15799,7 @@
                 <a:latin typeface="Times New Roman" panose="02020603050405020304" pitchFamily="18" charset="0"/>
                 <a:cs typeface="Times New Roman" panose="02020603050405020304" pitchFamily="18" charset="0"/>
               </a:rPr>
-              <a:t>. </a:t>
-            </a:r>
-            <a:r>
-              <a:rPr lang="en-US" sz="4000" b="1" dirty="0" smtClean="0">
-                <a:solidFill>
-                  <a:srgbClr val="7030A0"/>
-                </a:solidFill>
-                <a:latin typeface="Times New Roman" panose="02020603050405020304" pitchFamily="18" charset="0"/>
-                <a:cs typeface="Times New Roman" panose="02020603050405020304" pitchFamily="18" charset="0"/>
-              </a:rPr>
-              <a:t>Overfitting.</a:t>
+              <a:t>. Overfitting.</a:t>
             </a:r>
             <a:endParaRPr lang="en-US" sz="4000" b="1" dirty="0">
               <a:solidFill>
@@ -16094,7 +15819,7 @@
         </p:nvSpPr>
         <p:spPr>
           <a:xfrm>
-            <a:off x="497305" y="1796716"/>
+            <a:off x="678538" y="1400530"/>
             <a:ext cx="11261558" cy="3139321"/>
           </a:xfrm>
           <a:prstGeom prst="rect">
@@ -16108,42 +15833,37 @@
           </a:bodyPr>
           <a:lstStyle/>
           <a:p>
-            <a:r>
-              <a:rPr lang="en-US" dirty="0" err="1" smtClean="0"/>
+            <a:pPr algn="just"/>
+            <a:r>
+              <a:rPr lang="en-US" b="1" dirty="0" err="1" smtClean="0"/>
               <a:t>Giải</a:t>
             </a:r>
             <a:r>
-              <a:rPr lang="en-US" dirty="0" smtClean="0"/>
-              <a:t> </a:t>
-            </a:r>
-            <a:r>
-              <a:rPr lang="en-US" dirty="0" err="1" smtClean="0"/>
+              <a:rPr lang="en-US" b="1" dirty="0" smtClean="0"/>
+              <a:t> </a:t>
+            </a:r>
+            <a:r>
+              <a:rPr lang="en-US" b="1" dirty="0" err="1" smtClean="0"/>
               <a:t>pháp</a:t>
             </a:r>
             <a:r>
-              <a:rPr lang="en-US" dirty="0" smtClean="0"/>
+              <a:rPr lang="en-US" b="1" dirty="0" smtClean="0"/>
               <a:t>:</a:t>
             </a:r>
           </a:p>
           <a:p>
+            <a:pPr algn="just"/>
             <a:endParaRPr lang="en-US" dirty="0" smtClean="0"/>
           </a:p>
           <a:p>
-            <a:r>
-              <a:rPr lang="en-US" dirty="0" err="1" smtClean="0"/>
-              <a:t>Sử</a:t>
-            </a:r>
-            <a:r>
-              <a:rPr lang="en-US" dirty="0" smtClean="0"/>
-              <a:t> </a:t>
-            </a:r>
-            <a:r>
-              <a:rPr lang="en-US" dirty="0" err="1" smtClean="0"/>
-              <a:t>dụng</a:t>
-            </a:r>
-            <a:r>
-              <a:rPr lang="en-US" dirty="0" smtClean="0"/>
-              <a:t> validation: </a:t>
+            <a:pPr algn="just"/>
+            <a:r>
+              <a:rPr lang="en-US" b="1" dirty="0" smtClean="0"/>
+              <a:t>Validation</a:t>
+            </a:r>
+            <a:r>
+              <a:rPr lang="en-US" dirty="0" smtClean="0"/>
+              <a:t>: </a:t>
             </a:r>
             <a:r>
               <a:rPr lang="en-US" dirty="0" err="1" smtClean="0"/>
@@ -16259,12 +15979,18 @@
             </a:r>
           </a:p>
           <a:p>
+            <a:pPr algn="just"/>
             <a:endParaRPr lang="en-US" dirty="0" smtClean="0"/>
           </a:p>
           <a:p>
-            <a:r>
-              <a:rPr lang="en-US" dirty="0" smtClean="0"/>
-              <a:t>Cross-validation: chia </a:t>
+            <a:pPr algn="just"/>
+            <a:r>
+              <a:rPr lang="en-US" b="1" dirty="0" smtClean="0"/>
+              <a:t>Cross-validation</a:t>
+            </a:r>
+            <a:r>
+              <a:rPr lang="en-US" dirty="0" smtClean="0"/>
+              <a:t>: chia </a:t>
             </a:r>
             <a:r>
               <a:rPr lang="en-US" dirty="0" err="1" smtClean="0"/>
@@ -16580,12 +16306,18 @@
             </a:r>
           </a:p>
           <a:p>
+            <a:pPr algn="just"/>
             <a:endParaRPr lang="en-US" dirty="0"/>
           </a:p>
           <a:p>
-            <a:r>
-              <a:rPr lang="en-US" dirty="0" smtClean="0"/>
-              <a:t>Early stopping:</a:t>
+            <a:pPr algn="just"/>
+            <a:r>
+              <a:rPr lang="en-US" b="1" dirty="0" smtClean="0"/>
+              <a:t>Early stopping</a:t>
+            </a:r>
+            <a:r>
+              <a:rPr lang="en-US" dirty="0" smtClean="0"/>
+              <a:t>:</a:t>
             </a:r>
             <a:r>
               <a:rPr lang="en-US" dirty="0"/>
@@ -16689,12 +16421,118 @@
             </a:r>
           </a:p>
           <a:p>
+            <a:pPr algn="just"/>
             <a:endParaRPr lang="en-US" dirty="0"/>
           </a:p>
           <a:p>
-            <a:r>
-              <a:rPr lang="en-US" dirty="0" smtClean="0"/>
-              <a:t>Dropout: multilayer perceptron.</a:t>
+            <a:pPr algn="just"/>
+            <a:r>
+              <a:rPr lang="en-US" b="1" dirty="0" smtClean="0"/>
+              <a:t>Dropout</a:t>
+            </a:r>
+            <a:r>
+              <a:rPr lang="en-US" dirty="0" smtClean="0"/>
+              <a:t>: multilayer </a:t>
+            </a:r>
+            <a:r>
+              <a:rPr lang="en-US" dirty="0" smtClean="0"/>
+              <a:t>perceptron: </a:t>
+            </a:r>
+            <a:r>
+              <a:rPr lang="en-US" dirty="0" err="1" smtClean="0"/>
+              <a:t>tại</a:t>
+            </a:r>
+            <a:r>
+              <a:rPr lang="en-US" dirty="0" smtClean="0"/>
+              <a:t> </a:t>
+            </a:r>
+            <a:r>
+              <a:rPr lang="en-US" dirty="0" err="1" smtClean="0"/>
+              <a:t>mỗi</a:t>
+            </a:r>
+            <a:r>
+              <a:rPr lang="en-US" dirty="0" smtClean="0"/>
+              <a:t> epoch, </a:t>
+            </a:r>
+            <a:r>
+              <a:rPr lang="en-US" dirty="0" err="1" smtClean="0"/>
+              <a:t>không</a:t>
+            </a:r>
+            <a:r>
+              <a:rPr lang="en-US" dirty="0" smtClean="0"/>
+              <a:t> </a:t>
+            </a:r>
+            <a:r>
+              <a:rPr lang="en-US" dirty="0" err="1" smtClean="0"/>
+              <a:t>dùng</a:t>
+            </a:r>
+            <a:r>
+              <a:rPr lang="en-US" dirty="0" smtClean="0"/>
+              <a:t> </a:t>
+            </a:r>
+            <a:r>
+              <a:rPr lang="en-US" dirty="0" err="1" smtClean="0"/>
+              <a:t>hết</a:t>
+            </a:r>
+            <a:r>
+              <a:rPr lang="en-US" dirty="0" smtClean="0"/>
+              <a:t> neurons </a:t>
+            </a:r>
+            <a:r>
+              <a:rPr lang="en-US" dirty="0" err="1" smtClean="0"/>
+              <a:t>để</a:t>
+            </a:r>
+            <a:r>
+              <a:rPr lang="en-US" dirty="0" smtClean="0"/>
+              <a:t> training, </a:t>
+            </a:r>
+            <a:r>
+              <a:rPr lang="en-US" dirty="0" err="1" smtClean="0"/>
+              <a:t>mà</a:t>
+            </a:r>
+            <a:r>
+              <a:rPr lang="en-US" dirty="0" smtClean="0"/>
+              <a:t> </a:t>
+            </a:r>
+            <a:r>
+              <a:rPr lang="en-US" dirty="0" err="1" smtClean="0"/>
+              <a:t>chỉ</a:t>
+            </a:r>
+            <a:r>
+              <a:rPr lang="en-US" dirty="0" smtClean="0"/>
+              <a:t> </a:t>
+            </a:r>
+            <a:r>
+              <a:rPr lang="en-US" dirty="0" err="1" smtClean="0"/>
+              <a:t>lấy</a:t>
+            </a:r>
+            <a:r>
+              <a:rPr lang="en-US" dirty="0" smtClean="0"/>
+              <a:t> </a:t>
+            </a:r>
+            <a:r>
+              <a:rPr lang="en-US" dirty="0" err="1" smtClean="0"/>
+              <a:t>theo</a:t>
+            </a:r>
+            <a:r>
+              <a:rPr lang="en-US" dirty="0" smtClean="0"/>
+              <a:t> </a:t>
+            </a:r>
+            <a:r>
+              <a:rPr lang="en-US" dirty="0" err="1" smtClean="0"/>
+              <a:t>tỉ</a:t>
+            </a:r>
+            <a:r>
+              <a:rPr lang="en-US" dirty="0" smtClean="0"/>
+              <a:t> </a:t>
+            </a:r>
+            <a:r>
+              <a:rPr lang="en-US" dirty="0" err="1" smtClean="0"/>
+              <a:t>lệ</a:t>
+            </a:r>
+            <a:r>
+              <a:rPr lang="en-US" dirty="0" smtClean="0"/>
+              <a:t>.</a:t>
             </a:r>
             <a:endParaRPr lang="en-US" dirty="0" smtClean="0"/>
           </a:p>
@@ -16749,13 +16587,13 @@
         </p:nvSpPr>
         <p:spPr>
           <a:xfrm>
-            <a:off x="0" y="0"/>
-            <a:ext cx="12192000" cy="749643"/>
+            <a:off x="0" y="1"/>
+            <a:ext cx="12192000" cy="502508"/>
           </a:xfrm>
         </p:spPr>
         <p:txBody>
           <a:bodyPr>
-            <a:normAutofit/>
+            <a:normAutofit fontScale="90000"/>
           </a:bodyPr>
           <a:lstStyle/>
           <a:p>
@@ -16980,17 +16818,7 @@
                 <a:latin typeface="Times New Roman" panose="02020603050405020304" pitchFamily="18" charset="0"/>
                 <a:cs typeface="Times New Roman" panose="02020603050405020304" pitchFamily="18" charset="0"/>
               </a:rPr>
-              <a:t>. </a:t>
-            </a:r>
-            <a:r>
-              <a:rPr lang="en-US" sz="4000" b="1" dirty="0" smtClean="0">
-                <a:solidFill>
-                  <a:srgbClr val="7030A0"/>
-                </a:solidFill>
-                <a:latin typeface="Times New Roman" panose="02020603050405020304" pitchFamily="18" charset="0"/>
-                <a:cs typeface="Times New Roman" panose="02020603050405020304" pitchFamily="18" charset="0"/>
-              </a:rPr>
-              <a:t>Overfitting: Dropout.</a:t>
+              <a:t>. Overfitting: Dropout.</a:t>
             </a:r>
             <a:endParaRPr lang="en-US" sz="4000" b="1" dirty="0">
               <a:solidFill>
@@ -17195,8 +17023,21 @@
             </a:r>
             <a:r>
               <a:rPr lang="en-US" dirty="0" smtClean="0"/>
-              <a:t> features.</a:t>
-            </a:r>
+              <a:t> </a:t>
+            </a:r>
+            <a:r>
+              <a:rPr lang="en-US" dirty="0" smtClean="0"/>
+              <a:t>features </a:t>
+            </a:r>
+            <a:r>
+              <a:rPr lang="en-US" dirty="0" err="1" smtClean="0"/>
+              <a:t>bằng</a:t>
+            </a:r>
+            <a:r>
+              <a:rPr lang="en-US" dirty="0" smtClean="0"/>
+              <a:t> filter.</a:t>
+            </a:r>
+            <a:endParaRPr lang="en-US" dirty="0" smtClean="0"/>
           </a:p>
           <a:p>
             <a:pPr marL="285750" indent="-285750">
@@ -17279,8 +17120,73 @@
             </a:r>
             <a:r>
               <a:rPr lang="en-US" dirty="0" smtClean="0"/>
-              <a:t> features.</a:t>
-            </a:r>
+              <a:t> </a:t>
+            </a:r>
+            <a:r>
+              <a:rPr lang="en-US" dirty="0" smtClean="0"/>
+              <a:t>features (</a:t>
+            </a:r>
+            <a:r>
+              <a:rPr lang="en-US" dirty="0" err="1" smtClean="0"/>
+              <a:t>lấy</a:t>
+            </a:r>
+            <a:r>
+              <a:rPr lang="en-US" dirty="0" smtClean="0"/>
+              <a:t> </a:t>
+            </a:r>
+            <a:r>
+              <a:rPr lang="en-US" dirty="0" err="1" smtClean="0"/>
+              <a:t>giá</a:t>
+            </a:r>
+            <a:r>
+              <a:rPr lang="en-US" dirty="0" smtClean="0"/>
+              <a:t> </a:t>
+            </a:r>
+            <a:r>
+              <a:rPr lang="en-US" dirty="0" err="1" smtClean="0"/>
+              <a:t>trị</a:t>
+            </a:r>
+            <a:r>
+              <a:rPr lang="en-US" dirty="0" smtClean="0"/>
+              <a:t> </a:t>
+            </a:r>
+            <a:r>
+              <a:rPr lang="en-US" dirty="0" err="1" smtClean="0"/>
+              <a:t>trung</a:t>
+            </a:r>
+            <a:r>
+              <a:rPr lang="en-US" dirty="0" smtClean="0"/>
+              <a:t> </a:t>
+            </a:r>
+            <a:r>
+              <a:rPr lang="en-US" dirty="0" err="1" smtClean="0"/>
+              <a:t>bình</a:t>
+            </a:r>
+            <a:r>
+              <a:rPr lang="en-US" dirty="0" smtClean="0"/>
+              <a:t>, </a:t>
+            </a:r>
+            <a:r>
+              <a:rPr lang="en-US" dirty="0" err="1" smtClean="0"/>
+              <a:t>giá</a:t>
+            </a:r>
+            <a:r>
+              <a:rPr lang="en-US" dirty="0" smtClean="0"/>
+              <a:t> </a:t>
+            </a:r>
+            <a:r>
+              <a:rPr lang="en-US" dirty="0" err="1" smtClean="0"/>
+              <a:t>trị</a:t>
+            </a:r>
+            <a:r>
+              <a:rPr lang="en-US" dirty="0" smtClean="0"/>
+              <a:t> max, …</a:t>
+            </a:r>
+            <a:r>
+              <a:rPr lang="en-US" dirty="0" smtClean="0"/>
+              <a:t>).</a:t>
+            </a:r>
+            <a:endParaRPr lang="en-US" dirty="0" smtClean="0"/>
           </a:p>
           <a:p>
             <a:pPr marL="285750" indent="-285750">
@@ -18285,7 +18191,7 @@
         <p:spPr>
           <a:xfrm>
             <a:off x="0" y="0"/>
-            <a:ext cx="12192000" cy="969190"/>
+            <a:ext cx="12290854" cy="650789"/>
           </a:xfrm>
         </p:spPr>
         <p:txBody>
@@ -18518,12 +18424,12 @@
         <p:spPr>
           <a:xfrm>
             <a:off x="0" y="0"/>
-            <a:ext cx="12192000" cy="823784"/>
+            <a:ext cx="12274378" cy="560173"/>
           </a:xfrm>
         </p:spPr>
         <p:txBody>
           <a:bodyPr>
-            <a:normAutofit/>
+            <a:normAutofit fontScale="90000"/>
           </a:bodyPr>
           <a:lstStyle/>
           <a:p>
@@ -18760,13 +18666,13 @@
         </p:nvSpPr>
         <p:spPr>
           <a:xfrm>
-            <a:off x="0" y="0"/>
-            <a:ext cx="12192000" cy="963827"/>
+            <a:off x="-1" y="0"/>
+            <a:ext cx="12266141" cy="565981"/>
           </a:xfrm>
         </p:spPr>
         <p:txBody>
           <a:bodyPr>
-            <a:normAutofit/>
+            <a:normAutofit fontScale="90000"/>
           </a:bodyPr>
           <a:lstStyle/>
           <a:p>
@@ -18906,7 +18812,7 @@
         </p:blipFill>
         <p:spPr>
           <a:xfrm>
-            <a:off x="296562" y="3020783"/>
+            <a:off x="350457" y="1978048"/>
             <a:ext cx="11782074" cy="3763683"/>
           </a:xfrm>
           <a:prstGeom prst="rect">
@@ -18994,12 +18900,12 @@
         <p:spPr>
           <a:xfrm>
             <a:off x="-1" y="0"/>
-            <a:ext cx="12257903" cy="856735"/>
+            <a:ext cx="12257904" cy="576649"/>
           </a:xfrm>
         </p:spPr>
         <p:txBody>
           <a:bodyPr>
-            <a:normAutofit/>
+            <a:normAutofit fontScale="90000"/>
           </a:bodyPr>
           <a:lstStyle/>
           <a:p>

</xml_diff>

<commit_message>
Kết thúc buổi học rồi. Dọn dẹp thôi....4/12/2020
</commit_message>
<xml_diff>
--- a/FinalProject/Final.pptx
+++ b/FinalProject/Final.pptx
@@ -47,10 +47,10 @@
     <p:sldId id="409" r:id="rId41"/>
     <p:sldId id="410" r:id="rId42"/>
     <p:sldId id="412" r:id="rId43"/>
-    <p:sldId id="413" r:id="rId44"/>
+    <p:sldId id="417" r:id="rId44"/>
     <p:sldId id="414" r:id="rId45"/>
-    <p:sldId id="415" r:id="rId46"/>
-    <p:sldId id="416" r:id="rId47"/>
+    <p:sldId id="416" r:id="rId46"/>
+    <p:sldId id="415" r:id="rId47"/>
     <p:sldId id="386" r:id="rId48"/>
     <p:sldId id="392" r:id="rId49"/>
     <p:sldId id="396" r:id="rId50"/>
@@ -598,7 +598,7 @@
           <a:p>
             <a:fld id="{27F2142A-344C-4C4D-B170-0C798B2E94BC}" type="datetimeFigureOut">
               <a:rPr lang="en-US" smtClean="0"/>
-              <a:t>11/29/2020</a:t>
+              <a:t>12/4/2020</a:t>
             </a:fld>
             <a:endParaRPr lang="en-US"/>
           </a:p>
@@ -768,7 +768,7 @@
           <a:p>
             <a:fld id="{27F2142A-344C-4C4D-B170-0C798B2E94BC}" type="datetimeFigureOut">
               <a:rPr lang="en-US" smtClean="0"/>
-              <a:t>11/29/2020</a:t>
+              <a:t>12/4/2020</a:t>
             </a:fld>
             <a:endParaRPr lang="en-US"/>
           </a:p>
@@ -948,7 +948,7 @@
           <a:p>
             <a:fld id="{27F2142A-344C-4C4D-B170-0C798B2E94BC}" type="datetimeFigureOut">
               <a:rPr lang="en-US" smtClean="0"/>
-              <a:t>11/29/2020</a:t>
+              <a:t>12/4/2020</a:t>
             </a:fld>
             <a:endParaRPr lang="en-US"/>
           </a:p>
@@ -1118,7 +1118,7 @@
           <a:p>
             <a:fld id="{27F2142A-344C-4C4D-B170-0C798B2E94BC}" type="datetimeFigureOut">
               <a:rPr lang="en-US" smtClean="0"/>
-              <a:t>11/29/2020</a:t>
+              <a:t>12/4/2020</a:t>
             </a:fld>
             <a:endParaRPr lang="en-US"/>
           </a:p>
@@ -1364,7 +1364,7 @@
           <a:p>
             <a:fld id="{27F2142A-344C-4C4D-B170-0C798B2E94BC}" type="datetimeFigureOut">
               <a:rPr lang="en-US" smtClean="0"/>
-              <a:t>11/29/2020</a:t>
+              <a:t>12/4/2020</a:t>
             </a:fld>
             <a:endParaRPr lang="en-US"/>
           </a:p>
@@ -1596,7 +1596,7 @@
           <a:p>
             <a:fld id="{27F2142A-344C-4C4D-B170-0C798B2E94BC}" type="datetimeFigureOut">
               <a:rPr lang="en-US" smtClean="0"/>
-              <a:t>11/29/2020</a:t>
+              <a:t>12/4/2020</a:t>
             </a:fld>
             <a:endParaRPr lang="en-US"/>
           </a:p>
@@ -1963,7 +1963,7 @@
           <a:p>
             <a:fld id="{27F2142A-344C-4C4D-B170-0C798B2E94BC}" type="datetimeFigureOut">
               <a:rPr lang="en-US" smtClean="0"/>
-              <a:t>11/29/2020</a:t>
+              <a:t>12/4/2020</a:t>
             </a:fld>
             <a:endParaRPr lang="en-US"/>
           </a:p>
@@ -2081,7 +2081,7 @@
           <a:p>
             <a:fld id="{27F2142A-344C-4C4D-B170-0C798B2E94BC}" type="datetimeFigureOut">
               <a:rPr lang="en-US" smtClean="0"/>
-              <a:t>11/29/2020</a:t>
+              <a:t>12/4/2020</a:t>
             </a:fld>
             <a:endParaRPr lang="en-US"/>
           </a:p>
@@ -2176,7 +2176,7 @@
           <a:p>
             <a:fld id="{27F2142A-344C-4C4D-B170-0C798B2E94BC}" type="datetimeFigureOut">
               <a:rPr lang="en-US" smtClean="0"/>
-              <a:t>11/29/2020</a:t>
+              <a:t>12/4/2020</a:t>
             </a:fld>
             <a:endParaRPr lang="en-US"/>
           </a:p>
@@ -2453,7 +2453,7 @@
           <a:p>
             <a:fld id="{27F2142A-344C-4C4D-B170-0C798B2E94BC}" type="datetimeFigureOut">
               <a:rPr lang="en-US" smtClean="0"/>
-              <a:t>11/29/2020</a:t>
+              <a:t>12/4/2020</a:t>
             </a:fld>
             <a:endParaRPr lang="en-US"/>
           </a:p>
@@ -2706,7 +2706,7 @@
           <a:p>
             <a:fld id="{27F2142A-344C-4C4D-B170-0C798B2E94BC}" type="datetimeFigureOut">
               <a:rPr lang="en-US" smtClean="0"/>
-              <a:t>11/29/2020</a:t>
+              <a:t>12/4/2020</a:t>
             </a:fld>
             <a:endParaRPr lang="en-US"/>
           </a:p>
@@ -2919,7 +2919,7 @@
           <a:p>
             <a:fld id="{27F2142A-344C-4C4D-B170-0C798B2E94BC}" type="datetimeFigureOut">
               <a:rPr lang="en-US" smtClean="0"/>
-              <a:t>11/29/2020</a:t>
+              <a:t>12/4/2020</a:t>
             </a:fld>
             <a:endParaRPr lang="en-US"/>
           </a:p>
@@ -7827,7 +7827,7 @@
         </p:nvSpPr>
         <p:spPr>
           <a:xfrm>
-            <a:off x="-1" y="1"/>
+            <a:off x="-1" y="41191"/>
             <a:ext cx="12257903" cy="473740"/>
           </a:xfrm>
         </p:spPr>
@@ -9148,17 +9148,7 @@
                 <a:latin typeface="Times New Roman" panose="02020603050405020304" pitchFamily="18" charset="0"/>
                 <a:cs typeface="Times New Roman" panose="02020603050405020304" pitchFamily="18" charset="0"/>
               </a:rPr>
-              <a:t>5. </a:t>
-            </a:r>
-            <a:r>
-              <a:rPr lang="en-US" sz="4000" b="1" dirty="0" smtClean="0">
-                <a:solidFill>
-                  <a:srgbClr val="7030A0"/>
-                </a:solidFill>
-                <a:latin typeface="Times New Roman" panose="02020603050405020304" pitchFamily="18" charset="0"/>
-                <a:cs typeface="Times New Roman" panose="02020603050405020304" pitchFamily="18" charset="0"/>
-              </a:rPr>
-              <a:t>Train, Test, Validation.</a:t>
+              <a:t>5. Train, Test, Validation.</a:t>
             </a:r>
             <a:endParaRPr lang="en-US" sz="4000" b="1" dirty="0">
               <a:solidFill>
@@ -13652,7 +13642,7 @@
         </p:nvSpPr>
         <p:spPr>
           <a:xfrm>
-            <a:off x="543952" y="1449958"/>
+            <a:off x="1282139" y="3069886"/>
             <a:ext cx="1181734" cy="369332"/>
           </a:xfrm>
           <a:prstGeom prst="rect">
@@ -13682,7 +13672,7 @@
         </p:nvSpPr>
         <p:spPr>
           <a:xfrm>
-            <a:off x="6470820" y="1449958"/>
+            <a:off x="9148118" y="3069886"/>
             <a:ext cx="1462965" cy="369332"/>
           </a:xfrm>
           <a:prstGeom prst="rect">
@@ -13706,7 +13696,7 @@
       </p:sp>
       <p:pic>
         <p:nvPicPr>
-          <p:cNvPr id="3" name="Picture 2"/>
+          <p:cNvPr id="5" name="Picture 4"/>
           <p:cNvPicPr>
             <a:picLocks noChangeAspect="1"/>
           </p:cNvPicPr>
@@ -13720,8 +13710,8 @@
         </p:blipFill>
         <p:spPr>
           <a:xfrm>
-            <a:off x="543952" y="1868718"/>
-            <a:ext cx="5019675" cy="1905000"/>
+            <a:off x="418127" y="3439218"/>
+            <a:ext cx="5048250" cy="1876425"/>
           </a:xfrm>
           <a:prstGeom prst="rect">
             <a:avLst/>
@@ -13730,7 +13720,7 @@
       </p:pic>
       <p:pic>
         <p:nvPicPr>
-          <p:cNvPr id="4" name="Picture 3"/>
+          <p:cNvPr id="6" name="Picture 5"/>
           <p:cNvPicPr>
             <a:picLocks noChangeAspect="1"/>
           </p:cNvPicPr>
@@ -13744,8 +13734,32 @@
         </p:blipFill>
         <p:spPr>
           <a:xfrm>
-            <a:off x="6470820" y="1892530"/>
-            <a:ext cx="4953000" cy="1857375"/>
+            <a:off x="6628755" y="3527522"/>
+            <a:ext cx="5038725" cy="1885950"/>
+          </a:xfrm>
+          <a:prstGeom prst="rect">
+            <a:avLst/>
+          </a:prstGeom>
+        </p:spPr>
+      </p:pic>
+      <p:pic>
+        <p:nvPicPr>
+          <p:cNvPr id="7" name="Picture 6"/>
+          <p:cNvPicPr>
+            <a:picLocks noChangeAspect="1"/>
+          </p:cNvPicPr>
+          <p:nvPr/>
+        </p:nvPicPr>
+        <p:blipFill>
+          <a:blip r:embed="rId4"/>
+          <a:stretch>
+            <a:fillRect/>
+          </a:stretch>
+        </p:blipFill>
+        <p:spPr>
+          <a:xfrm>
+            <a:off x="1873006" y="1060111"/>
+            <a:ext cx="8620125" cy="2009775"/>
           </a:xfrm>
           <a:prstGeom prst="rect">
             <a:avLst/>
@@ -13857,7 +13871,7 @@
         </p:blipFill>
         <p:spPr>
           <a:xfrm>
-            <a:off x="546400" y="1941038"/>
+            <a:off x="509587" y="2798633"/>
             <a:ext cx="5019675" cy="2514600"/>
           </a:xfrm>
           <a:prstGeom prst="rect">
@@ -13881,7 +13895,7 @@
         </p:blipFill>
         <p:spPr>
           <a:xfrm>
-            <a:off x="6423454" y="1941038"/>
+            <a:off x="6450599" y="2921341"/>
             <a:ext cx="5029200" cy="2486025"/>
           </a:xfrm>
           <a:prstGeom prst="rect">
@@ -13897,7 +13911,7 @@
         </p:nvSpPr>
         <p:spPr>
           <a:xfrm>
-            <a:off x="543952" y="1449958"/>
+            <a:off x="1326351" y="2429301"/>
             <a:ext cx="1181734" cy="369332"/>
           </a:xfrm>
           <a:prstGeom prst="rect">
@@ -13927,7 +13941,7 @@
         </p:nvSpPr>
         <p:spPr>
           <a:xfrm>
-            <a:off x="6470820" y="1449958"/>
+            <a:off x="8233717" y="2429301"/>
             <a:ext cx="1462965" cy="369332"/>
           </a:xfrm>
           <a:prstGeom prst="rect">
@@ -13949,6 +13963,30 @@
           </a:p>
         </p:txBody>
       </p:sp>
+      <p:pic>
+        <p:nvPicPr>
+          <p:cNvPr id="4" name="Picture 3"/>
+          <p:cNvPicPr>
+            <a:picLocks noChangeAspect="1"/>
+          </p:cNvPicPr>
+          <p:nvPr/>
+        </p:nvPicPr>
+        <p:blipFill>
+          <a:blip r:embed="rId4"/>
+          <a:stretch>
+            <a:fillRect/>
+          </a:stretch>
+        </p:blipFill>
+        <p:spPr>
+          <a:xfrm>
+            <a:off x="3019425" y="1044386"/>
+            <a:ext cx="6153150" cy="962025"/>
+          </a:xfrm>
+          <a:prstGeom prst="rect">
+            <a:avLst/>
+          </a:prstGeom>
+        </p:spPr>
+      </p:pic>
     </p:spTree>
     <p:extLst>
       <p:ext uri="{BB962C8B-B14F-4D97-AF65-F5344CB8AC3E}">
@@ -13999,12 +14037,12 @@
         <p:spPr>
           <a:xfrm>
             <a:off x="0" y="0"/>
-            <a:ext cx="12192000" cy="906162"/>
+            <a:ext cx="12192000" cy="593124"/>
           </a:xfrm>
         </p:spPr>
         <p:txBody>
           <a:bodyPr>
-            <a:normAutofit/>
+            <a:normAutofit fontScale="90000"/>
           </a:bodyPr>
           <a:lstStyle/>
           <a:p>
@@ -14048,69 +14086,9 @@
           </a:p>
         </p:txBody>
       </p:sp>
-      <p:sp>
-        <p:nvSpPr>
-          <p:cNvPr id="6" name="TextBox 5"/>
-          <p:cNvSpPr txBox="1"/>
-          <p:nvPr/>
-        </p:nvSpPr>
-        <p:spPr>
-          <a:xfrm>
-            <a:off x="634314" y="1581665"/>
-            <a:ext cx="1181734" cy="369332"/>
-          </a:xfrm>
-          <a:prstGeom prst="rect">
-            <a:avLst/>
-          </a:prstGeom>
-          <a:noFill/>
-        </p:spPr>
-        <p:txBody>
-          <a:bodyPr wrap="none" rtlCol="0">
-            <a:spAutoFit/>
-          </a:bodyPr>
-          <a:lstStyle/>
-          <a:p>
-            <a:r>
-              <a:rPr lang="en-US" dirty="0" smtClean="0"/>
-              <a:t>Up sample</a:t>
-            </a:r>
-            <a:endParaRPr lang="en-US" dirty="0"/>
-          </a:p>
-        </p:txBody>
-      </p:sp>
-      <p:sp>
-        <p:nvSpPr>
-          <p:cNvPr id="7" name="TextBox 6"/>
-          <p:cNvSpPr txBox="1"/>
-          <p:nvPr/>
-        </p:nvSpPr>
-        <p:spPr>
-          <a:xfrm>
-            <a:off x="6117620" y="1581665"/>
-            <a:ext cx="1462965" cy="369332"/>
-          </a:xfrm>
-          <a:prstGeom prst="rect">
-            <a:avLst/>
-          </a:prstGeom>
-          <a:noFill/>
-        </p:spPr>
-        <p:txBody>
-          <a:bodyPr wrap="none" rtlCol="0">
-            <a:spAutoFit/>
-          </a:bodyPr>
-          <a:lstStyle/>
-          <a:p>
-            <a:r>
-              <a:rPr lang="en-US" dirty="0" smtClean="0"/>
-              <a:t>Down sample</a:t>
-            </a:r>
-            <a:endParaRPr lang="en-US" dirty="0"/>
-          </a:p>
-        </p:txBody>
-      </p:sp>
       <p:pic>
         <p:nvPicPr>
-          <p:cNvPr id="3" name="Picture 2"/>
+          <p:cNvPr id="10" name="Picture 9"/>
           <p:cNvPicPr>
             <a:picLocks noChangeAspect="1"/>
           </p:cNvPicPr>
@@ -14124,8 +14102,8 @@
         </p:blipFill>
         <p:spPr>
           <a:xfrm>
-            <a:off x="634314" y="2093986"/>
-            <a:ext cx="5038725" cy="1847850"/>
+            <a:off x="1627359" y="848497"/>
+            <a:ext cx="8048625" cy="3257550"/>
           </a:xfrm>
           <a:prstGeom prst="rect">
             <a:avLst/>
@@ -14134,7 +14112,7 @@
       </p:pic>
       <p:pic>
         <p:nvPicPr>
-          <p:cNvPr id="8" name="Picture 7"/>
+          <p:cNvPr id="12" name="Picture 11"/>
           <p:cNvPicPr>
             <a:picLocks noChangeAspect="1"/>
           </p:cNvPicPr>
@@ -14148,8 +14126,8 @@
         </p:blipFill>
         <p:spPr>
           <a:xfrm>
-            <a:off x="6117620" y="2132132"/>
-            <a:ext cx="5038725" cy="1924050"/>
+            <a:off x="3548062" y="4106047"/>
+            <a:ext cx="5095875" cy="1866900"/>
           </a:xfrm>
           <a:prstGeom prst="rect">
             <a:avLst/>
@@ -14205,13 +14183,13 @@
         </p:nvSpPr>
         <p:spPr>
           <a:xfrm>
-            <a:off x="0" y="0"/>
-            <a:ext cx="12192000" cy="996778"/>
+            <a:off x="0" y="1"/>
+            <a:ext cx="12192000" cy="626076"/>
           </a:xfrm>
         </p:spPr>
         <p:txBody>
           <a:bodyPr>
-            <a:normAutofit/>
+            <a:normAutofit fontScale="90000"/>
           </a:bodyPr>
           <a:lstStyle/>
           <a:p>
@@ -14223,7 +14201,7 @@
                 <a:latin typeface="Times New Roman" panose="02020603050405020304" pitchFamily="18" charset="0"/>
                 <a:cs typeface="Times New Roman" panose="02020603050405020304" pitchFamily="18" charset="0"/>
               </a:rPr>
-              <a:t>9.2 Complement Naïve Bayes.</a:t>
+              <a:t>9.2 Gaussian Naïve Bayes.</a:t>
             </a:r>
             <a:endParaRPr lang="en-US" sz="4000" b="1" dirty="0">
               <a:solidFill>
@@ -14243,7 +14221,7 @@
         </p:nvSpPr>
         <p:spPr>
           <a:xfrm>
-            <a:off x="634314" y="1609812"/>
+            <a:off x="634314" y="1590003"/>
             <a:ext cx="1181734" cy="369332"/>
           </a:xfrm>
           <a:prstGeom prst="rect">
@@ -14273,7 +14251,7 @@
         </p:nvSpPr>
         <p:spPr>
           <a:xfrm>
-            <a:off x="6170137" y="1609812"/>
+            <a:off x="6170137" y="1590003"/>
             <a:ext cx="1462965" cy="369332"/>
           </a:xfrm>
           <a:prstGeom prst="rect">
@@ -14311,8 +14289,8 @@
         </p:blipFill>
         <p:spPr>
           <a:xfrm>
-            <a:off x="634314" y="2188426"/>
-            <a:ext cx="5029200" cy="1885950"/>
+            <a:off x="634314" y="1959335"/>
+            <a:ext cx="5067300" cy="1914525"/>
           </a:xfrm>
           <a:prstGeom prst="rect">
             <a:avLst/>
@@ -14335,8 +14313,8 @@
         </p:blipFill>
         <p:spPr>
           <a:xfrm>
-            <a:off x="6170137" y="2188426"/>
-            <a:ext cx="5019675" cy="1866900"/>
+            <a:off x="6170137" y="1959335"/>
+            <a:ext cx="5153025" cy="2009775"/>
           </a:xfrm>
           <a:prstGeom prst="rect">
             <a:avLst/>
@@ -14346,7 +14324,7 @@
     </p:spTree>
     <p:extLst>
       <p:ext uri="{BB962C8B-B14F-4D97-AF65-F5344CB8AC3E}">
-        <p14:creationId xmlns:p14="http://schemas.microsoft.com/office/powerpoint/2010/main" val="3358453339"/>
+        <p14:creationId xmlns:p14="http://schemas.microsoft.com/office/powerpoint/2010/main" val="1593725736"/>
       </p:ext>
     </p:extLst>
   </p:cSld>
@@ -14392,13 +14370,13 @@
         </p:nvSpPr>
         <p:spPr>
           <a:xfrm>
-            <a:off x="0" y="0"/>
-            <a:ext cx="12192000" cy="980303"/>
+            <a:off x="0" y="1"/>
+            <a:ext cx="12192000" cy="626076"/>
           </a:xfrm>
         </p:spPr>
         <p:txBody>
           <a:bodyPr>
-            <a:normAutofit/>
+            <a:normAutofit fontScale="90000"/>
           </a:bodyPr>
           <a:lstStyle/>
           <a:p>
@@ -14430,7 +14408,7 @@
         </p:nvSpPr>
         <p:spPr>
           <a:xfrm>
-            <a:off x="634314" y="1400530"/>
+            <a:off x="634314" y="1590003"/>
             <a:ext cx="1181734" cy="369332"/>
           </a:xfrm>
           <a:prstGeom prst="rect">
@@ -14460,7 +14438,7 @@
         </p:nvSpPr>
         <p:spPr>
           <a:xfrm>
-            <a:off x="6170137" y="1400530"/>
+            <a:off x="6170137" y="1590003"/>
             <a:ext cx="1462965" cy="369332"/>
           </a:xfrm>
           <a:prstGeom prst="rect">
@@ -14498,7 +14476,7 @@
         </p:blipFill>
         <p:spPr>
           <a:xfrm>
-            <a:off x="634314" y="1853643"/>
+            <a:off x="634314" y="2026010"/>
             <a:ext cx="4972050" cy="1819275"/>
           </a:xfrm>
           <a:prstGeom prst="rect">
@@ -14522,7 +14500,7 @@
         </p:blipFill>
         <p:spPr>
           <a:xfrm>
-            <a:off x="6170137" y="1858085"/>
+            <a:off x="6170137" y="1992672"/>
             <a:ext cx="5057775" cy="1885950"/>
           </a:xfrm>
           <a:prstGeom prst="rect">
@@ -14580,34 +14558,24 @@
         <p:spPr>
           <a:xfrm>
             <a:off x="0" y="0"/>
-            <a:ext cx="12192000" cy="988541"/>
+            <a:ext cx="12192000" cy="601362"/>
           </a:xfrm>
         </p:spPr>
         <p:txBody>
           <a:bodyPr>
-            <a:normAutofit/>
+            <a:normAutofit fontScale="90000"/>
           </a:bodyPr>
           <a:lstStyle/>
           <a:p>
             <a:r>
-              <a:rPr lang="en-US" sz="4000" b="1" dirty="0">
-                <a:solidFill>
-                  <a:srgbClr val="7030A0"/>
-                </a:solidFill>
-                <a:latin typeface="Times New Roman" panose="02020603050405020304" pitchFamily="18" charset="0"/>
-                <a:cs typeface="Times New Roman" panose="02020603050405020304" pitchFamily="18" charset="0"/>
-              </a:rPr>
-              <a:t>8</a:t>
-            </a:r>
-            <a:r>
-              <a:rPr lang="en-US" sz="4000" b="1" dirty="0" smtClean="0">
-                <a:solidFill>
-                  <a:srgbClr val="7030A0"/>
-                </a:solidFill>
-                <a:latin typeface="Times New Roman" panose="02020603050405020304" pitchFamily="18" charset="0"/>
-                <a:cs typeface="Times New Roman" panose="02020603050405020304" pitchFamily="18" charset="0"/>
-              </a:rPr>
-              <a:t>. SVM: up sample.</a:t>
+              <a:rPr lang="en-US" sz="4000" b="1" dirty="0" smtClean="0">
+                <a:solidFill>
+                  <a:srgbClr val="7030A0"/>
+                </a:solidFill>
+                <a:latin typeface="Times New Roman" panose="02020603050405020304" pitchFamily="18" charset="0"/>
+                <a:cs typeface="Times New Roman" panose="02020603050405020304" pitchFamily="18" charset="0"/>
+              </a:rPr>
+              <a:t>10. SVM: down sample.</a:t>
             </a:r>
             <a:endParaRPr lang="en-US" sz="4000" b="1" dirty="0">
               <a:solidFill>
@@ -14627,7 +14595,7 @@
         </p:nvSpPr>
         <p:spPr>
           <a:xfrm>
-            <a:off x="986825" y="1400530"/>
+            <a:off x="986825" y="1103966"/>
             <a:ext cx="2219454" cy="369332"/>
           </a:xfrm>
           <a:prstGeom prst="rect">
@@ -14656,7 +14624,7 @@
         </p:nvSpPr>
         <p:spPr>
           <a:xfrm>
-            <a:off x="6639955" y="1400530"/>
+            <a:off x="6639955" y="1103966"/>
             <a:ext cx="4296048" cy="369332"/>
           </a:xfrm>
           <a:prstGeom prst="rect">
@@ -14690,7 +14658,7 @@
         </p:nvSpPr>
         <p:spPr>
           <a:xfrm>
-            <a:off x="986824" y="4127737"/>
+            <a:off x="986824" y="3831173"/>
             <a:ext cx="3688317" cy="369332"/>
           </a:xfrm>
           <a:prstGeom prst="rect">
@@ -14724,7 +14692,7 @@
         </p:nvSpPr>
         <p:spPr>
           <a:xfrm>
-            <a:off x="6095905" y="4127737"/>
+            <a:off x="6095905" y="3831173"/>
             <a:ext cx="3168624" cy="369332"/>
           </a:xfrm>
           <a:prstGeom prst="rect">
@@ -14760,7 +14728,7 @@
       </p:sp>
       <p:pic>
         <p:nvPicPr>
-          <p:cNvPr id="16" name="Picture 15"/>
+          <p:cNvPr id="4" name="Picture 3"/>
           <p:cNvPicPr>
             <a:picLocks noChangeAspect="1"/>
           </p:cNvPicPr>
@@ -14774,8 +14742,8 @@
         </p:blipFill>
         <p:spPr>
           <a:xfrm>
-            <a:off x="6095905" y="4497069"/>
-            <a:ext cx="5048250" cy="2114550"/>
+            <a:off x="701379" y="1415057"/>
+            <a:ext cx="5095875" cy="2105025"/>
           </a:xfrm>
           <a:prstGeom prst="rect">
             <a:avLst/>
@@ -14784,7 +14752,7 @@
       </p:pic>
       <p:pic>
         <p:nvPicPr>
-          <p:cNvPr id="17" name="Picture 16"/>
+          <p:cNvPr id="5" name="Picture 4"/>
           <p:cNvPicPr>
             <a:picLocks noChangeAspect="1"/>
           </p:cNvPicPr>
@@ -14798,8 +14766,56 @@
         </p:blipFill>
         <p:spPr>
           <a:xfrm>
-            <a:off x="986824" y="4487544"/>
-            <a:ext cx="5019675" cy="2124075"/>
+            <a:off x="6244804" y="1473298"/>
+            <a:ext cx="5086350" cy="2085975"/>
+          </a:xfrm>
+          <a:prstGeom prst="rect">
+            <a:avLst/>
+          </a:prstGeom>
+        </p:spPr>
+      </p:pic>
+      <p:pic>
+        <p:nvPicPr>
+          <p:cNvPr id="14" name="Picture 13"/>
+          <p:cNvPicPr>
+            <a:picLocks noChangeAspect="1"/>
+          </p:cNvPicPr>
+          <p:nvPr/>
+        </p:nvPicPr>
+        <p:blipFill>
+          <a:blip r:embed="rId4"/>
+          <a:stretch>
+            <a:fillRect/>
+          </a:stretch>
+        </p:blipFill>
+        <p:spPr>
+          <a:xfrm>
+            <a:off x="734716" y="4200505"/>
+            <a:ext cx="5029200" cy="2066925"/>
+          </a:xfrm>
+          <a:prstGeom prst="rect">
+            <a:avLst/>
+          </a:prstGeom>
+        </p:spPr>
+      </p:pic>
+      <p:pic>
+        <p:nvPicPr>
+          <p:cNvPr id="15" name="Picture 14"/>
+          <p:cNvPicPr>
+            <a:picLocks noChangeAspect="1"/>
+          </p:cNvPicPr>
+          <p:nvPr/>
+        </p:nvPicPr>
+        <p:blipFill>
+          <a:blip r:embed="rId5"/>
+          <a:stretch>
+            <a:fillRect/>
+          </a:stretch>
+        </p:blipFill>
+        <p:spPr>
+          <a:xfrm>
+            <a:off x="6244804" y="4291441"/>
+            <a:ext cx="5010150" cy="2047875"/>
           </a:xfrm>
           <a:prstGeom prst="rect">
             <a:avLst/>
@@ -14809,7 +14825,7 @@
     </p:spTree>
     <p:extLst>
       <p:ext uri="{BB962C8B-B14F-4D97-AF65-F5344CB8AC3E}">
-        <p14:creationId xmlns:p14="http://schemas.microsoft.com/office/powerpoint/2010/main" val="2572237814"/>
+        <p14:creationId xmlns:p14="http://schemas.microsoft.com/office/powerpoint/2010/main" val="749372173"/>
       </p:ext>
     </p:extLst>
   </p:cSld>
@@ -14855,35 +14871,25 @@
         </p:nvSpPr>
         <p:spPr>
           <a:xfrm>
-            <a:off x="0" y="0"/>
-            <a:ext cx="12192000" cy="889686"/>
+            <a:off x="0" y="1"/>
+            <a:ext cx="12192000" cy="609600"/>
           </a:xfrm>
         </p:spPr>
         <p:txBody>
           <a:bodyPr>
-            <a:normAutofit/>
+            <a:normAutofit fontScale="90000"/>
           </a:bodyPr>
           <a:lstStyle/>
           <a:p>
             <a:r>
-              <a:rPr lang="en-US" sz="4000" b="1" dirty="0">
-                <a:solidFill>
-                  <a:srgbClr val="7030A0"/>
-                </a:solidFill>
-                <a:latin typeface="Times New Roman" panose="02020603050405020304" pitchFamily="18" charset="0"/>
-                <a:cs typeface="Times New Roman" panose="02020603050405020304" pitchFamily="18" charset="0"/>
-              </a:rPr>
-              <a:t>8</a:t>
-            </a:r>
-            <a:r>
-              <a:rPr lang="en-US" sz="4000" b="1" dirty="0" smtClean="0">
-                <a:solidFill>
-                  <a:srgbClr val="7030A0"/>
-                </a:solidFill>
-                <a:latin typeface="Times New Roman" panose="02020603050405020304" pitchFamily="18" charset="0"/>
-                <a:cs typeface="Times New Roman" panose="02020603050405020304" pitchFamily="18" charset="0"/>
-              </a:rPr>
-              <a:t>. SVM: down sample.</a:t>
+              <a:rPr lang="en-US" sz="4000" b="1" dirty="0" smtClean="0">
+                <a:solidFill>
+                  <a:srgbClr val="7030A0"/>
+                </a:solidFill>
+                <a:latin typeface="Times New Roman" panose="02020603050405020304" pitchFamily="18" charset="0"/>
+                <a:cs typeface="Times New Roman" panose="02020603050405020304" pitchFamily="18" charset="0"/>
+              </a:rPr>
+              <a:t>10. SVM: up sample.</a:t>
             </a:r>
             <a:endParaRPr lang="en-US" sz="4000" b="1" dirty="0">
               <a:solidFill>
@@ -14966,7 +14972,7 @@
         </p:nvSpPr>
         <p:spPr>
           <a:xfrm>
-            <a:off x="986824" y="4127737"/>
+            <a:off x="986824" y="3485184"/>
             <a:ext cx="3688317" cy="369332"/>
           </a:xfrm>
           <a:prstGeom prst="rect">
@@ -15000,7 +15006,7 @@
         </p:nvSpPr>
         <p:spPr>
           <a:xfrm>
-            <a:off x="6095905" y="4127737"/>
+            <a:off x="6095905" y="3485184"/>
             <a:ext cx="3168624" cy="369332"/>
           </a:xfrm>
           <a:prstGeom prst="rect">
@@ -15036,7 +15042,7 @@
       </p:sp>
       <p:pic>
         <p:nvPicPr>
-          <p:cNvPr id="4" name="Picture 3"/>
+          <p:cNvPr id="16" name="Picture 15"/>
           <p:cNvPicPr>
             <a:picLocks noChangeAspect="1"/>
           </p:cNvPicPr>
@@ -15050,8 +15056,8 @@
         </p:blipFill>
         <p:spPr>
           <a:xfrm>
-            <a:off x="701379" y="1711621"/>
-            <a:ext cx="5095875" cy="2105025"/>
+            <a:off x="6095905" y="3854516"/>
+            <a:ext cx="5048250" cy="2114550"/>
           </a:xfrm>
           <a:prstGeom prst="rect">
             <a:avLst/>
@@ -15060,7 +15066,7 @@
       </p:pic>
       <p:pic>
         <p:nvPicPr>
-          <p:cNvPr id="5" name="Picture 4"/>
+          <p:cNvPr id="17" name="Picture 16"/>
           <p:cNvPicPr>
             <a:picLocks noChangeAspect="1"/>
           </p:cNvPicPr>
@@ -15074,56 +15080,8 @@
         </p:blipFill>
         <p:spPr>
           <a:xfrm>
-            <a:off x="6244804" y="1769862"/>
-            <a:ext cx="5086350" cy="2085975"/>
-          </a:xfrm>
-          <a:prstGeom prst="rect">
-            <a:avLst/>
-          </a:prstGeom>
-        </p:spPr>
-      </p:pic>
-      <p:pic>
-        <p:nvPicPr>
-          <p:cNvPr id="14" name="Picture 13"/>
-          <p:cNvPicPr>
-            <a:picLocks noChangeAspect="1"/>
-          </p:cNvPicPr>
-          <p:nvPr/>
-        </p:nvPicPr>
-        <p:blipFill>
-          <a:blip r:embed="rId4"/>
-          <a:stretch>
-            <a:fillRect/>
-          </a:stretch>
-        </p:blipFill>
-        <p:spPr>
-          <a:xfrm>
-            <a:off x="734716" y="4497069"/>
-            <a:ext cx="5029200" cy="2066925"/>
-          </a:xfrm>
-          <a:prstGeom prst="rect">
-            <a:avLst/>
-          </a:prstGeom>
-        </p:spPr>
-      </p:pic>
-      <p:pic>
-        <p:nvPicPr>
-          <p:cNvPr id="15" name="Picture 14"/>
-          <p:cNvPicPr>
-            <a:picLocks noChangeAspect="1"/>
-          </p:cNvPicPr>
-          <p:nvPr/>
-        </p:nvPicPr>
-        <p:blipFill>
-          <a:blip r:embed="rId5"/>
-          <a:stretch>
-            <a:fillRect/>
-          </a:stretch>
-        </p:blipFill>
-        <p:spPr>
-          <a:xfrm>
-            <a:off x="6244804" y="4588005"/>
-            <a:ext cx="5010150" cy="2047875"/>
+            <a:off x="986824" y="3844991"/>
+            <a:ext cx="5019675" cy="2124075"/>
           </a:xfrm>
           <a:prstGeom prst="rect">
             <a:avLst/>
@@ -15133,7 +15091,7 @@
     </p:spTree>
     <p:extLst>
       <p:ext uri="{BB962C8B-B14F-4D97-AF65-F5344CB8AC3E}">
-        <p14:creationId xmlns:p14="http://schemas.microsoft.com/office/powerpoint/2010/main" val="749372173"/>
+        <p14:creationId xmlns:p14="http://schemas.microsoft.com/office/powerpoint/2010/main" val="2572237814"/>
       </p:ext>
     </p:extLst>
   </p:cSld>
@@ -15180,7 +15138,7 @@
         <p:spPr>
           <a:xfrm>
             <a:off x="0" y="0"/>
-            <a:ext cx="10007600" cy="1400530"/>
+            <a:ext cx="12192000" cy="659027"/>
           </a:xfrm>
         </p:spPr>
         <p:txBody>
@@ -15190,24 +15148,14 @@
           <a:lstStyle/>
           <a:p>
             <a:r>
-              <a:rPr lang="en-US" sz="4000" b="1" dirty="0">
-                <a:solidFill>
-                  <a:srgbClr val="7030A0"/>
-                </a:solidFill>
-                <a:latin typeface="Times New Roman" panose="02020603050405020304" pitchFamily="18" charset="0"/>
-                <a:cs typeface="Times New Roman" panose="02020603050405020304" pitchFamily="18" charset="0"/>
-              </a:rPr>
-              <a:t>9</a:t>
-            </a:r>
-            <a:r>
-              <a:rPr lang="en-US" sz="4000" b="1" dirty="0" smtClean="0">
-                <a:solidFill>
-                  <a:srgbClr val="7030A0"/>
-                </a:solidFill>
-                <a:latin typeface="Times New Roman" panose="02020603050405020304" pitchFamily="18" charset="0"/>
-                <a:cs typeface="Times New Roman" panose="02020603050405020304" pitchFamily="18" charset="0"/>
-              </a:rPr>
-              <a:t>. Overfitting.</a:t>
+              <a:rPr lang="en-US" sz="4000" b="1" dirty="0" smtClean="0">
+                <a:solidFill>
+                  <a:srgbClr val="7030A0"/>
+                </a:solidFill>
+                <a:latin typeface="Times New Roman" panose="02020603050405020304" pitchFamily="18" charset="0"/>
+                <a:cs typeface="Times New Roman" panose="02020603050405020304" pitchFamily="18" charset="0"/>
+              </a:rPr>
+              <a:t>11. Overfitting.</a:t>
             </a:r>
             <a:endParaRPr lang="en-US" sz="4000" b="1" dirty="0">
               <a:solidFill>
@@ -15438,27 +15386,7 @@
                 <a:latin typeface="Times New Roman" panose="02020603050405020304" pitchFamily="18" charset="0"/>
                 <a:cs typeface="Times New Roman" panose="02020603050405020304" pitchFamily="18" charset="0"/>
               </a:rPr>
-              <a:t> </a:t>
-            </a:r>
-            <a:r>
-              <a:rPr lang="en-US" dirty="0" smtClean="0">
-                <a:solidFill>
-                  <a:srgbClr val="000000"/>
-                </a:solidFill>
-                <a:latin typeface="Times New Roman" panose="02020603050405020304" pitchFamily="18" charset="0"/>
-                <a:cs typeface="Times New Roman" panose="02020603050405020304" pitchFamily="18" charset="0"/>
-              </a:rPr>
-              <a:t>unseen</a:t>
-            </a:r>
-            <a:r>
-              <a:rPr lang="en-US" dirty="0" smtClean="0">
-                <a:solidFill>
-                  <a:srgbClr val="000000"/>
-                </a:solidFill>
-                <a:latin typeface="Times New Roman" panose="02020603050405020304" pitchFamily="18" charset="0"/>
-                <a:cs typeface="Times New Roman" panose="02020603050405020304" pitchFamily="18" charset="0"/>
-              </a:rPr>
-              <a:t>, </a:t>
+              <a:t> unseen, </a:t>
             </a:r>
             <a:r>
               <a:rPr lang="en-US" dirty="0" err="1" smtClean="0">
@@ -15653,7 +15581,7 @@
         <p:spPr>
           <a:xfrm>
             <a:off x="0" y="0"/>
-            <a:ext cx="10007600" cy="1400530"/>
+            <a:ext cx="12192000" cy="642551"/>
           </a:xfrm>
         </p:spPr>
         <p:txBody>
@@ -15663,24 +15591,14 @@
           <a:lstStyle/>
           <a:p>
             <a:r>
-              <a:rPr lang="en-US" sz="4000" b="1" dirty="0">
-                <a:solidFill>
-                  <a:srgbClr val="7030A0"/>
-                </a:solidFill>
-                <a:latin typeface="Times New Roman" panose="02020603050405020304" pitchFamily="18" charset="0"/>
-                <a:cs typeface="Times New Roman" panose="02020603050405020304" pitchFamily="18" charset="0"/>
-              </a:rPr>
-              <a:t>9</a:t>
-            </a:r>
-            <a:r>
-              <a:rPr lang="en-US" sz="4000" b="1" dirty="0" smtClean="0">
-                <a:solidFill>
-                  <a:srgbClr val="7030A0"/>
-                </a:solidFill>
-                <a:latin typeface="Times New Roman" panose="02020603050405020304" pitchFamily="18" charset="0"/>
-                <a:cs typeface="Times New Roman" panose="02020603050405020304" pitchFamily="18" charset="0"/>
-              </a:rPr>
-              <a:t>. Overfitting.</a:t>
+              <a:rPr lang="en-US" sz="4000" b="1" dirty="0" smtClean="0">
+                <a:solidFill>
+                  <a:srgbClr val="7030A0"/>
+                </a:solidFill>
+                <a:latin typeface="Times New Roman" panose="02020603050405020304" pitchFamily="18" charset="0"/>
+                <a:cs typeface="Times New Roman" panose="02020603050405020304" pitchFamily="18" charset="0"/>
+              </a:rPr>
+              <a:t>11. Overfitting.</a:t>
             </a:r>
             <a:endParaRPr lang="en-US" sz="4000" b="1" dirty="0">
               <a:solidFill>
@@ -15771,35 +15689,25 @@
         </p:nvSpPr>
         <p:spPr>
           <a:xfrm>
-            <a:off x="0" y="0"/>
-            <a:ext cx="10007600" cy="1400530"/>
+            <a:off x="-1" y="0"/>
+            <a:ext cx="12192001" cy="584886"/>
           </a:xfrm>
         </p:spPr>
         <p:txBody>
           <a:bodyPr>
-            <a:normAutofit/>
+            <a:normAutofit fontScale="90000"/>
           </a:bodyPr>
           <a:lstStyle/>
           <a:p>
             <a:r>
-              <a:rPr lang="en-US" sz="4000" b="1" dirty="0">
-                <a:solidFill>
-                  <a:srgbClr val="7030A0"/>
-                </a:solidFill>
-                <a:latin typeface="Times New Roman" panose="02020603050405020304" pitchFamily="18" charset="0"/>
-                <a:cs typeface="Times New Roman" panose="02020603050405020304" pitchFamily="18" charset="0"/>
-              </a:rPr>
-              <a:t>9</a:t>
-            </a:r>
-            <a:r>
-              <a:rPr lang="en-US" sz="4000" b="1" dirty="0" smtClean="0">
-                <a:solidFill>
-                  <a:srgbClr val="7030A0"/>
-                </a:solidFill>
-                <a:latin typeface="Times New Roman" panose="02020603050405020304" pitchFamily="18" charset="0"/>
-                <a:cs typeface="Times New Roman" panose="02020603050405020304" pitchFamily="18" charset="0"/>
-              </a:rPr>
-              <a:t>. Overfitting.</a:t>
+              <a:rPr lang="en-US" sz="4000" b="1" dirty="0" smtClean="0">
+                <a:solidFill>
+                  <a:srgbClr val="7030A0"/>
+                </a:solidFill>
+                <a:latin typeface="Times New Roman" panose="02020603050405020304" pitchFamily="18" charset="0"/>
+                <a:cs typeface="Times New Roman" panose="02020603050405020304" pitchFamily="18" charset="0"/>
+              </a:rPr>
+              <a:t>11. Overfitting.</a:t>
             </a:r>
             <a:endParaRPr lang="en-US" sz="4000" b="1" dirty="0">
               <a:solidFill>
@@ -16413,6 +16321,14 @@
             </a:r>
             <a:r>
               <a:rPr lang="en-US" dirty="0" err="1" smtClean="0"/>
+              <a:t>quá</a:t>
+            </a:r>
+            <a:r>
+              <a:rPr lang="en-US" dirty="0" smtClean="0"/>
+              <a:t> </a:t>
+            </a:r>
+            <a:r>
+              <a:rPr lang="en-US" dirty="0" err="1" smtClean="0"/>
               <a:t>nhỏ</a:t>
             </a:r>
             <a:r>
@@ -16432,11 +16348,7 @@
             </a:r>
             <a:r>
               <a:rPr lang="en-US" dirty="0" smtClean="0"/>
-              <a:t>: multilayer </a:t>
-            </a:r>
-            <a:r>
-              <a:rPr lang="en-US" dirty="0" smtClean="0"/>
-              <a:t>perceptron: </a:t>
+              <a:t>: multilayer perceptron: </a:t>
             </a:r>
             <a:r>
               <a:rPr lang="en-US" dirty="0" err="1" smtClean="0"/>
@@ -16534,7 +16446,6 @@
               <a:rPr lang="en-US" dirty="0" smtClean="0"/>
               <a:t>.</a:t>
             </a:r>
-            <a:endParaRPr lang="en-US" dirty="0" smtClean="0"/>
           </a:p>
         </p:txBody>
       </p:sp>
@@ -16741,6 +16652,30 @@
           </a:prstGeom>
         </p:spPr>
       </p:pic>
+      <p:pic>
+        <p:nvPicPr>
+          <p:cNvPr id="5" name="Picture 4"/>
+          <p:cNvPicPr>
+            <a:picLocks noChangeAspect="1"/>
+          </p:cNvPicPr>
+          <p:nvPr/>
+        </p:nvPicPr>
+        <p:blipFill>
+          <a:blip r:embed="rId3"/>
+          <a:stretch>
+            <a:fillRect/>
+          </a:stretch>
+        </p:blipFill>
+        <p:spPr>
+          <a:xfrm>
+            <a:off x="706006" y="1053318"/>
+            <a:ext cx="1609725" cy="523875"/>
+          </a:xfrm>
+          <a:prstGeom prst="rect">
+            <a:avLst/>
+          </a:prstGeom>
+        </p:spPr>
+      </p:pic>
     </p:spTree>
     <p:extLst>
       <p:ext uri="{BB962C8B-B14F-4D97-AF65-F5344CB8AC3E}">
@@ -16791,34 +16726,24 @@
         <p:spPr>
           <a:xfrm>
             <a:off x="0" y="0"/>
-            <a:ext cx="10007600" cy="1400530"/>
+            <a:ext cx="12192000" cy="634314"/>
           </a:xfrm>
         </p:spPr>
         <p:txBody>
           <a:bodyPr>
-            <a:normAutofit/>
+            <a:normAutofit fontScale="90000"/>
           </a:bodyPr>
           <a:lstStyle/>
           <a:p>
             <a:r>
-              <a:rPr lang="en-US" sz="4000" b="1" dirty="0">
-                <a:solidFill>
-                  <a:srgbClr val="7030A0"/>
-                </a:solidFill>
-                <a:latin typeface="Times New Roman" panose="02020603050405020304" pitchFamily="18" charset="0"/>
-                <a:cs typeface="Times New Roman" panose="02020603050405020304" pitchFamily="18" charset="0"/>
-              </a:rPr>
-              <a:t>9</a:t>
-            </a:r>
-            <a:r>
-              <a:rPr lang="en-US" sz="4000" b="1" dirty="0" smtClean="0">
-                <a:solidFill>
-                  <a:srgbClr val="7030A0"/>
-                </a:solidFill>
-                <a:latin typeface="Times New Roman" panose="02020603050405020304" pitchFamily="18" charset="0"/>
-                <a:cs typeface="Times New Roman" panose="02020603050405020304" pitchFamily="18" charset="0"/>
-              </a:rPr>
-              <a:t>. Overfitting: Dropout.</a:t>
+              <a:rPr lang="en-US" sz="4000" b="1" dirty="0" smtClean="0">
+                <a:solidFill>
+                  <a:srgbClr val="7030A0"/>
+                </a:solidFill>
+                <a:latin typeface="Times New Roman" panose="02020603050405020304" pitchFamily="18" charset="0"/>
+                <a:cs typeface="Times New Roman" panose="02020603050405020304" pitchFamily="18" charset="0"/>
+              </a:rPr>
+              <a:t>11. Overfitting: Dropout.</a:t>
             </a:r>
             <a:endParaRPr lang="en-US" sz="4000" b="1" dirty="0">
               <a:solidFill>
@@ -16928,12 +16853,12 @@
         <p:spPr>
           <a:xfrm>
             <a:off x="0" y="0"/>
-            <a:ext cx="10007600" cy="1400530"/>
+            <a:ext cx="12192000" cy="560173"/>
           </a:xfrm>
         </p:spPr>
         <p:txBody>
           <a:bodyPr>
-            <a:normAutofit/>
+            <a:normAutofit fontScale="90000"/>
           </a:bodyPr>
           <a:lstStyle/>
           <a:p>
@@ -16965,7 +16890,7 @@
         </p:nvSpPr>
         <p:spPr>
           <a:xfrm>
-            <a:off x="529388" y="1574559"/>
+            <a:off x="529388" y="1080289"/>
             <a:ext cx="11498982" cy="1477328"/>
           </a:xfrm>
           <a:prstGeom prst="rect">
@@ -17023,11 +16948,7 @@
             </a:r>
             <a:r>
               <a:rPr lang="en-US" dirty="0" smtClean="0"/>
-              <a:t> </a:t>
-            </a:r>
-            <a:r>
-              <a:rPr lang="en-US" dirty="0" smtClean="0"/>
-              <a:t>features </a:t>
+              <a:t> features </a:t>
             </a:r>
             <a:r>
               <a:rPr lang="en-US" dirty="0" err="1" smtClean="0"/>
@@ -17037,7 +16958,6 @@
               <a:rPr lang="en-US" dirty="0" smtClean="0"/>
               <a:t> filter.</a:t>
             </a:r>
-            <a:endParaRPr lang="en-US" dirty="0" smtClean="0"/>
           </a:p>
           <a:p>
             <a:pPr marL="285750" indent="-285750">
@@ -17120,11 +17040,7 @@
             </a:r>
             <a:r>
               <a:rPr lang="en-US" dirty="0" smtClean="0"/>
-              <a:t> </a:t>
-            </a:r>
-            <a:r>
-              <a:rPr lang="en-US" dirty="0" smtClean="0"/>
-              <a:t>features (</a:t>
+              <a:t> features (</a:t>
             </a:r>
             <a:r>
               <a:rPr lang="en-US" dirty="0" err="1" smtClean="0"/>
@@ -17180,13 +17096,8 @@
             </a:r>
             <a:r>
               <a:rPr lang="en-US" dirty="0" smtClean="0"/>
-              <a:t> max, …</a:t>
-            </a:r>
-            <a:r>
-              <a:rPr lang="en-US" dirty="0" smtClean="0"/>
-              <a:t>).</a:t>
-            </a:r>
-            <a:endParaRPr lang="en-US" dirty="0" smtClean="0"/>
+              <a:t> max, …).</a:t>
+            </a:r>
           </a:p>
           <a:p>
             <a:pPr marL="285750" indent="-285750">
@@ -17342,7 +17253,7 @@
         </p:blipFill>
         <p:spPr>
           <a:xfrm>
-            <a:off x="2949892" y="3225917"/>
+            <a:off x="2949891" y="2557617"/>
             <a:ext cx="6657975" cy="3152775"/>
           </a:xfrm>
           <a:prstGeom prst="rect">
@@ -17400,12 +17311,12 @@
         <p:spPr>
           <a:xfrm>
             <a:off x="0" y="0"/>
-            <a:ext cx="10007600" cy="1400530"/>
+            <a:ext cx="12192000" cy="617838"/>
           </a:xfrm>
         </p:spPr>
         <p:txBody>
           <a:bodyPr>
-            <a:normAutofit/>
+            <a:normAutofit fontScale="90000"/>
           </a:bodyPr>
           <a:lstStyle/>
           <a:p>
@@ -17417,7 +17328,7 @@
                 <a:latin typeface="Times New Roman" panose="02020603050405020304" pitchFamily="18" charset="0"/>
                 <a:cs typeface="Times New Roman" panose="02020603050405020304" pitchFamily="18" charset="0"/>
               </a:rPr>
-              <a:t>10. Convolution Neural Network.</a:t>
+              <a:t>12. Convolution Neural Network.</a:t>
             </a:r>
             <a:endParaRPr lang="en-US" sz="4000" b="1" dirty="0">
               <a:solidFill>
@@ -17731,12 +17642,12 @@
         <p:spPr>
           <a:xfrm>
             <a:off x="0" y="0"/>
-            <a:ext cx="10007600" cy="1400530"/>
+            <a:ext cx="12192000" cy="593124"/>
           </a:xfrm>
         </p:spPr>
         <p:txBody>
           <a:bodyPr>
-            <a:normAutofit/>
+            <a:normAutofit fontScale="90000"/>
           </a:bodyPr>
           <a:lstStyle/>
           <a:p>
@@ -17748,7 +17659,7 @@
                 <a:latin typeface="Times New Roman" panose="02020603050405020304" pitchFamily="18" charset="0"/>
                 <a:cs typeface="Times New Roman" panose="02020603050405020304" pitchFamily="18" charset="0"/>
               </a:rPr>
-              <a:t>10. Convolution Neural Network.</a:t>
+              <a:t>12. Convolution Neural Network.</a:t>
             </a:r>
             <a:endParaRPr lang="en-US" sz="4000" b="1" dirty="0">
               <a:solidFill>
@@ -17858,12 +17769,12 @@
         <p:spPr>
           <a:xfrm>
             <a:off x="0" y="0"/>
-            <a:ext cx="10007600" cy="1400530"/>
+            <a:ext cx="12192000" cy="584886"/>
           </a:xfrm>
         </p:spPr>
         <p:txBody>
           <a:bodyPr>
-            <a:normAutofit/>
+            <a:normAutofit fontScale="90000"/>
           </a:bodyPr>
           <a:lstStyle/>
           <a:p>
@@ -17985,12 +17896,12 @@
         <p:spPr>
           <a:xfrm>
             <a:off x="0" y="0"/>
-            <a:ext cx="10007600" cy="1400530"/>
+            <a:ext cx="12192000" cy="634314"/>
           </a:xfrm>
         </p:spPr>
         <p:txBody>
           <a:bodyPr>
-            <a:normAutofit/>
+            <a:normAutofit fontScale="90000"/>
           </a:bodyPr>
           <a:lstStyle/>
           <a:p>
@@ -18002,7 +17913,7 @@
                 <a:latin typeface="Times New Roman" panose="02020603050405020304" pitchFamily="18" charset="0"/>
                 <a:cs typeface="Times New Roman" panose="02020603050405020304" pitchFamily="18" charset="0"/>
               </a:rPr>
-              <a:t>10. Convolution Neural Network.</a:t>
+              <a:t>12. Convolution Neural Network.</a:t>
             </a:r>
             <a:endParaRPr lang="en-US" sz="4000" b="1" dirty="0">
               <a:solidFill>
@@ -18088,7 +17999,7 @@
         <p:spPr>
           <a:xfrm>
             <a:off x="0" y="0"/>
-            <a:ext cx="10007600" cy="1400530"/>
+            <a:ext cx="12192000" cy="708454"/>
           </a:xfrm>
         </p:spPr>
         <p:txBody>
@@ -18105,7 +18016,7 @@
                 <a:latin typeface="Times New Roman" panose="02020603050405020304" pitchFamily="18" charset="0"/>
                 <a:cs typeface="Times New Roman" panose="02020603050405020304" pitchFamily="18" charset="0"/>
               </a:rPr>
-              <a:t>10. Convolution Neural Network.</a:t>
+              <a:t>12. Convolution Neural Network.</a:t>
             </a:r>
             <a:endParaRPr lang="en-US" sz="4000" b="1" dirty="0">
               <a:solidFill>

</xml_diff>